<commit_message>
upload at 2024-05-12 04:00:01
</commit_message>
<xml_diff>
--- a/PPT_이진규.pptx
+++ b/PPT_이진규.pptx
@@ -9,11 +9,12 @@
     <p:sldId id="296" r:id="rId3"/>
     <p:sldId id="297" r:id="rId4"/>
     <p:sldId id="298" r:id="rId5"/>
-    <p:sldId id="294" r:id="rId6"/>
-    <p:sldId id="295" r:id="rId7"/>
-    <p:sldId id="299" r:id="rId8"/>
-    <p:sldId id="300" r:id="rId9"/>
-    <p:sldId id="301" r:id="rId10"/>
+    <p:sldId id="302" r:id="rId6"/>
+    <p:sldId id="294" r:id="rId7"/>
+    <p:sldId id="295" r:id="rId8"/>
+    <p:sldId id="299" r:id="rId9"/>
+    <p:sldId id="300" r:id="rId10"/>
+    <p:sldId id="301" r:id="rId11"/>
   </p:sldIdLst>
   <p:sldSz cx="12192000" cy="6858000"/>
   <p:notesSz cx="6858000" cy="9144000"/>
@@ -278,7 +279,7 @@
           <a:p>
             <a:fld id="{5C85567D-AB5D-4AC7-81EF-B47DBFAE57A2}" type="datetimeFigureOut">
               <a:rPr lang="ko-KR" altLang="en-US" smtClean="0"/>
-              <a:t>2024-05-10</a:t>
+              <a:t>2024-05-11</a:t>
             </a:fld>
             <a:endParaRPr lang="ko-KR" altLang="en-US"/>
           </a:p>
@@ -578,7 +579,7 @@
           <a:p>
             <a:fld id="{5C85567D-AB5D-4AC7-81EF-B47DBFAE57A2}" type="datetimeFigureOut">
               <a:rPr lang="ko-KR" altLang="en-US" smtClean="0"/>
-              <a:t>2024-05-10</a:t>
+              <a:t>2024-05-11</a:t>
             </a:fld>
             <a:endParaRPr lang="ko-KR" altLang="en-US"/>
           </a:p>
@@ -788,7 +789,7 @@
           <a:p>
             <a:fld id="{5C85567D-AB5D-4AC7-81EF-B47DBFAE57A2}" type="datetimeFigureOut">
               <a:rPr lang="ko-KR" altLang="en-US" smtClean="0"/>
-              <a:t>2024-05-10</a:t>
+              <a:t>2024-05-11</a:t>
             </a:fld>
             <a:endParaRPr lang="ko-KR" altLang="en-US"/>
           </a:p>
@@ -1008,7 +1009,7 @@
           <a:p>
             <a:fld id="{5C85567D-AB5D-4AC7-81EF-B47DBFAE57A2}" type="datetimeFigureOut">
               <a:rPr lang="ko-KR" altLang="en-US" smtClean="0"/>
-              <a:t>2024-05-10</a:t>
+              <a:t>2024-05-11</a:t>
             </a:fld>
             <a:endParaRPr lang="ko-KR" altLang="en-US"/>
           </a:p>
@@ -1218,7 +1219,7 @@
           <a:p>
             <a:fld id="{5C85567D-AB5D-4AC7-81EF-B47DBFAE57A2}" type="datetimeFigureOut">
               <a:rPr lang="ko-KR" altLang="en-US" smtClean="0"/>
-              <a:t>2024-05-10</a:t>
+              <a:t>2024-05-11</a:t>
             </a:fld>
             <a:endParaRPr lang="ko-KR" altLang="en-US"/>
           </a:p>
@@ -1505,7 +1506,7 @@
           <a:p>
             <a:fld id="{5C85567D-AB5D-4AC7-81EF-B47DBFAE57A2}" type="datetimeFigureOut">
               <a:rPr lang="ko-KR" altLang="en-US" smtClean="0"/>
-              <a:t>2024-05-10</a:t>
+              <a:t>2024-05-11</a:t>
             </a:fld>
             <a:endParaRPr lang="ko-KR" altLang="en-US"/>
           </a:p>
@@ -1782,7 +1783,7 @@
           <a:p>
             <a:fld id="{5C85567D-AB5D-4AC7-81EF-B47DBFAE57A2}" type="datetimeFigureOut">
               <a:rPr lang="ko-KR" altLang="en-US" smtClean="0"/>
-              <a:t>2024-05-10</a:t>
+              <a:t>2024-05-11</a:t>
             </a:fld>
             <a:endParaRPr lang="ko-KR" altLang="en-US"/>
           </a:p>
@@ -2206,7 +2207,7 @@
           <a:p>
             <a:fld id="{5C85567D-AB5D-4AC7-81EF-B47DBFAE57A2}" type="datetimeFigureOut">
               <a:rPr lang="ko-KR" altLang="en-US" smtClean="0"/>
-              <a:t>2024-05-10</a:t>
+              <a:t>2024-05-11</a:t>
             </a:fld>
             <a:endParaRPr lang="ko-KR" altLang="en-US"/>
           </a:p>
@@ -2359,7 +2360,7 @@
           <a:p>
             <a:fld id="{5C85567D-AB5D-4AC7-81EF-B47DBFAE57A2}" type="datetimeFigureOut">
               <a:rPr lang="ko-KR" altLang="en-US" smtClean="0"/>
-              <a:t>2024-05-10</a:t>
+              <a:t>2024-05-11</a:t>
             </a:fld>
             <a:endParaRPr lang="ko-KR" altLang="en-US"/>
           </a:p>
@@ -2573,7 +2574,7 @@
           <a:p>
             <a:fld id="{5C85567D-AB5D-4AC7-81EF-B47DBFAE57A2}" type="datetimeFigureOut">
               <a:rPr lang="ko-KR" altLang="en-US" smtClean="0"/>
-              <a:t>2024-05-10</a:t>
+              <a:t>2024-05-11</a:t>
             </a:fld>
             <a:endParaRPr lang="ko-KR" altLang="en-US"/>
           </a:p>
@@ -2826,7 +2827,7 @@
           <a:p>
             <a:fld id="{5C85567D-AB5D-4AC7-81EF-B47DBFAE57A2}" type="datetimeFigureOut">
               <a:rPr lang="ko-KR" altLang="en-US" smtClean="0"/>
-              <a:t>2024-05-10</a:t>
+              <a:t>2024-05-11</a:t>
             </a:fld>
             <a:endParaRPr lang="ko-KR" altLang="en-US"/>
           </a:p>
@@ -3149,7 +3150,7 @@
           <a:p>
             <a:fld id="{5C85567D-AB5D-4AC7-81EF-B47DBFAE57A2}" type="datetimeFigureOut">
               <a:rPr lang="ko-KR" altLang="en-US" smtClean="0"/>
-              <a:t>2024-05-10</a:t>
+              <a:t>2024-05-11</a:t>
             </a:fld>
             <a:endParaRPr lang="ko-KR" altLang="en-US"/>
           </a:p>
@@ -3402,7 +3403,7 @@
           <a:p>
             <a:fld id="{5C85567D-AB5D-4AC7-81EF-B47DBFAE57A2}" type="datetimeFigureOut">
               <a:rPr lang="ko-KR" altLang="en-US" smtClean="0"/>
-              <a:t>2024-05-10</a:t>
+              <a:t>2024-05-11</a:t>
             </a:fld>
             <a:endParaRPr lang="ko-KR" altLang="en-US"/>
           </a:p>
@@ -4303,7 +4304,7 @@
 </p:sld>
 </file>
 
-<file path=ppt/slides/slide2.xml><?xml version="1.0" encoding="utf-8"?>
+<file path=ppt/slides/slide10.xml><?xml version="1.0" encoding="utf-8"?>
 <p:sld xmlns:a="http://schemas.openxmlformats.org/drawingml/2006/main" xmlns:r="http://schemas.openxmlformats.org/officeDocument/2006/relationships" xmlns:p="http://schemas.openxmlformats.org/presentationml/2006/main">
   <p:cSld>
     <p:spTree>
@@ -4387,7 +4388,7 @@
         <p:spPr>
           <a:xfrm>
             <a:off x="186080" y="202712"/>
-            <a:ext cx="2424062" cy="646331"/>
+            <a:ext cx="6179897" cy="646331"/>
           </a:xfrm>
           <a:prstGeom prst="rect">
             <a:avLst/>
@@ -4406,7 +4407,7 @@
                   <a:schemeClr val="bg1"/>
                 </a:solidFill>
               </a:rPr>
-              <a:t>분석 순서도</a:t>
+              <a:t>연구의 한계점 및 향후 연구제안</a:t>
             </a:r>
           </a:p>
         </p:txBody>
@@ -4426,7 +4427,7 @@
         <p:spPr>
           <a:xfrm>
             <a:off x="339536" y="1264666"/>
-            <a:ext cx="1601721" cy="461665"/>
+            <a:ext cx="1871025" cy="461665"/>
           </a:xfrm>
           <a:prstGeom prst="rect">
             <a:avLst/>
@@ -4446,7 +4447,7 @@
                 </a:solidFill>
                 <a:latin typeface="+mn-ea"/>
               </a:rPr>
-              <a:t>분석 순서도</a:t>
+              <a:t>연구의 한계점</a:t>
             </a:r>
           </a:p>
         </p:txBody>
@@ -4518,7 +4519,7 @@
         <p:spPr>
           <a:xfrm>
             <a:off x="132080" y="1913974"/>
-            <a:ext cx="8933715" cy="523220"/>
+            <a:ext cx="10539931" cy="738664"/>
           </a:xfrm>
           <a:prstGeom prst="rect">
             <a:avLst/>
@@ -4540,7 +4541,21 @@
                 <a:latin typeface="+mj-ea"/>
                 <a:ea typeface="+mj-ea"/>
               </a:rPr>
-              <a:t>아래와 같은 순서로 분석 진행</a:t>
+              <a:t>산재 </a:t>
+            </a:r>
+            <a:r>
+              <a:rPr lang="ko-KR" altLang="en-US" sz="1400" dirty="0" err="1">
+                <a:latin typeface="+mj-ea"/>
+                <a:ea typeface="+mj-ea"/>
+              </a:rPr>
+              <a:t>발생율</a:t>
+            </a:r>
+            <a:r>
+              <a:rPr lang="ko-KR" altLang="en-US" sz="1400" dirty="0">
+                <a:latin typeface="+mj-ea"/>
+                <a:ea typeface="+mj-ea"/>
+              </a:rPr>
+              <a:t> 자체는 확인하기 어려움</a:t>
             </a:r>
             <a:endParaRPr lang="en-US" altLang="ko-KR" sz="1400" dirty="0">
               <a:latin typeface="+mj-ea"/>
@@ -4548,86 +4563,33 @@
             </a:endParaRPr>
           </a:p>
           <a:p>
-            <a:pPr marL="742950" lvl="1" indent="-285750">
-              <a:buFont typeface="Arial" panose="020B0604020202020204" pitchFamily="34" charset="0"/>
-              <a:buChar char="•"/>
+            <a:pPr marL="228600" indent="-228600">
+              <a:buFont typeface="+mj-lt"/>
+              <a:buAutoNum type="arabicPeriod"/>
             </a:pPr>
+            <a:endParaRPr lang="en-US" altLang="ko-KR" sz="1400" dirty="0">
+              <a:latin typeface="+mj-ea"/>
+              <a:ea typeface="+mj-ea"/>
+            </a:endParaRPr>
+          </a:p>
+          <a:p>
+            <a:pPr marL="228600" indent="-228600">
+              <a:buFont typeface="+mj-lt"/>
+              <a:buAutoNum type="arabicPeriod"/>
+            </a:pPr>
+            <a:r>
+              <a:rPr lang="en-US" altLang="ko-KR" sz="1400" dirty="0">
+                <a:latin typeface="+mj-ea"/>
+                <a:ea typeface="+mj-ea"/>
+              </a:rPr>
+              <a:t>0.5</a:t>
+            </a:r>
             <a:r>
               <a:rPr lang="ko-KR" altLang="en-US" sz="1400" dirty="0">
                 <a:latin typeface="+mj-ea"/>
                 <a:ea typeface="+mj-ea"/>
               </a:rPr>
-              <a:t>데이터 수집 </a:t>
-            </a:r>
-            <a:r>
-              <a:rPr lang="en-US" altLang="ko-KR" sz="1400" dirty="0">
-                <a:latin typeface="+mj-ea"/>
-                <a:ea typeface="+mj-ea"/>
-              </a:rPr>
-              <a:t>– </a:t>
-            </a:r>
-            <a:r>
-              <a:rPr lang="ko-KR" altLang="en-US" sz="1400" dirty="0">
-                <a:latin typeface="+mj-ea"/>
-                <a:ea typeface="+mj-ea"/>
-              </a:rPr>
-              <a:t>데이터 분석 </a:t>
-            </a:r>
-            <a:r>
-              <a:rPr lang="en-US" altLang="ko-KR" sz="1400" dirty="0">
-                <a:latin typeface="+mj-ea"/>
-                <a:ea typeface="+mj-ea"/>
-              </a:rPr>
-              <a:t>(EDA) – </a:t>
-            </a:r>
-            <a:r>
-              <a:rPr lang="ko-KR" altLang="en-US" sz="1400" dirty="0">
-                <a:latin typeface="+mj-ea"/>
-                <a:ea typeface="+mj-ea"/>
-              </a:rPr>
-              <a:t>데이터 </a:t>
-            </a:r>
-            <a:r>
-              <a:rPr lang="ko-KR" altLang="en-US" sz="1400" dirty="0" err="1">
-                <a:latin typeface="+mj-ea"/>
-                <a:ea typeface="+mj-ea"/>
-              </a:rPr>
-              <a:t>전처리</a:t>
-            </a:r>
-            <a:r>
-              <a:rPr lang="ko-KR" altLang="en-US" sz="1400" dirty="0">
-                <a:latin typeface="+mj-ea"/>
-                <a:ea typeface="+mj-ea"/>
-              </a:rPr>
-              <a:t> </a:t>
-            </a:r>
-            <a:r>
-              <a:rPr lang="en-US" altLang="ko-KR" sz="1400" dirty="0">
-                <a:latin typeface="+mj-ea"/>
-                <a:ea typeface="+mj-ea"/>
-              </a:rPr>
-              <a:t>– </a:t>
-            </a:r>
-            <a:r>
-              <a:rPr lang="ko-KR" altLang="en-US" sz="1400" dirty="0">
-                <a:latin typeface="+mj-ea"/>
-                <a:ea typeface="+mj-ea"/>
-              </a:rPr>
-              <a:t>모델 구성 및 훈련 </a:t>
-            </a:r>
-            <a:r>
-              <a:rPr lang="en-US" altLang="ko-KR" sz="1400" dirty="0">
-                <a:latin typeface="+mj-ea"/>
-                <a:ea typeface="+mj-ea"/>
-              </a:rPr>
-              <a:t>– </a:t>
-            </a:r>
-            <a:r>
-              <a:rPr lang="ko-KR" altLang="en-US" sz="1400" dirty="0">
-                <a:latin typeface="+mj-ea"/>
-                <a:ea typeface="+mj-ea"/>
-              </a:rPr>
-              <a:t>모델 성능 평가</a:t>
+              <a:t>의 정확도에서 추가 개선 필요</a:t>
             </a:r>
             <a:endParaRPr lang="en-US" altLang="ko-KR" sz="1400" dirty="0">
               <a:latin typeface="+mj-ea"/>
@@ -4641,7 +4603,7 @@
           <p:cNvPr id="4" name="TextBox 3">
             <a:extLst>
               <a:ext uri="{FF2B5EF4-FFF2-40B4-BE49-F238E27FC236}">
-                <a16:creationId xmlns:a16="http://schemas.microsoft.com/office/drawing/2014/main" id="{32A5EA82-8E11-1E15-ECB1-027498A43557}"/>
+                <a16:creationId xmlns:a16="http://schemas.microsoft.com/office/drawing/2014/main" id="{22B319DF-CA88-A76F-145E-A9DFB4DF6BA3}"/>
               </a:ext>
             </a:extLst>
           </p:cNvPr>
@@ -4650,8 +4612,8 @@
         </p:nvSpPr>
         <p:spPr>
           <a:xfrm>
-            <a:off x="553453" y="2437035"/>
-            <a:ext cx="3199915" cy="369332"/>
+            <a:off x="3633537" y="2085313"/>
+            <a:ext cx="7301999" cy="369332"/>
           </a:xfrm>
           <a:prstGeom prst="rect">
             <a:avLst/>
@@ -4670,7 +4632,1398 @@
                   <a:srgbClr val="FF0000"/>
                 </a:solidFill>
               </a:rPr>
-              <a:t>큰 그림으로 간단하게 도식화</a:t>
+              <a:t>보다 상세하거나 필요한 기준에 알맞은 데이터가 추가되면 해소 가능</a:t>
+            </a:r>
+          </a:p>
+        </p:txBody>
+      </p:sp>
+    </p:spTree>
+    <p:extLst>
+      <p:ext uri="{BB962C8B-B14F-4D97-AF65-F5344CB8AC3E}">
+        <p14:creationId xmlns:p14="http://schemas.microsoft.com/office/powerpoint/2010/main" val="1567205572"/>
+      </p:ext>
+    </p:extLst>
+  </p:cSld>
+  <p:clrMapOvr>
+    <a:masterClrMapping/>
+  </p:clrMapOvr>
+  <mc:AlternateContent xmlns:mc="http://schemas.openxmlformats.org/markup-compatibility/2006" xmlns:p159="http://schemas.microsoft.com/office/powerpoint/2015/09/main">
+    <mc:Choice Requires="p159">
+      <p:transition xmlns:p14="http://schemas.microsoft.com/office/powerpoint/2010/main" spd="slow" p14:dur="2000" advClick="0" advTm="1000">
+        <p159:morph option="byObject"/>
+      </p:transition>
+    </mc:Choice>
+    <mc:Fallback xmlns="">
+      <p:transition spd="slow" advClick="0" advTm="1000">
+        <p:fade/>
+      </p:transition>
+    </mc:Fallback>
+  </mc:AlternateContent>
+</p:sld>
+</file>
+
+<file path=ppt/slides/slide2.xml><?xml version="1.0" encoding="utf-8"?>
+<p:sld xmlns:a="http://schemas.openxmlformats.org/drawingml/2006/main" xmlns:r="http://schemas.openxmlformats.org/officeDocument/2006/relationships" xmlns:p="http://schemas.openxmlformats.org/presentationml/2006/main">
+  <p:cSld>
+    <p:spTree>
+      <p:nvGrpSpPr>
+        <p:cNvPr id="1" name="">
+          <a:extLst>
+            <a:ext uri="{FF2B5EF4-FFF2-40B4-BE49-F238E27FC236}">
+              <a16:creationId xmlns:a16="http://schemas.microsoft.com/office/drawing/2014/main" id="{429D65BF-6060-DF5C-BE3F-59B65B413073}"/>
+            </a:ext>
+          </a:extLst>
+        </p:cNvPr>
+        <p:cNvGrpSpPr/>
+        <p:nvPr/>
+      </p:nvGrpSpPr>
+      <p:grpSpPr>
+        <a:xfrm>
+          <a:off x="0" y="0"/>
+          <a:ext cx="0" cy="0"/>
+          <a:chOff x="0" y="0"/>
+          <a:chExt cx="0" cy="0"/>
+        </a:xfrm>
+      </p:grpSpPr>
+      <p:sp>
+        <p:nvSpPr>
+          <p:cNvPr id="2" name="직사각형 1">
+            <a:extLst>
+              <a:ext uri="{FF2B5EF4-FFF2-40B4-BE49-F238E27FC236}">
+                <a16:creationId xmlns:a16="http://schemas.microsoft.com/office/drawing/2014/main" id="{1F3D8DAE-7E0B-4F90-8C19-B6EA5809081E}"/>
+              </a:ext>
+            </a:extLst>
+          </p:cNvPr>
+          <p:cNvSpPr/>
+          <p:nvPr/>
+        </p:nvSpPr>
+        <p:spPr>
+          <a:xfrm>
+            <a:off x="0" y="0"/>
+            <a:ext cx="12192000" cy="1076960"/>
+          </a:xfrm>
+          <a:prstGeom prst="rect">
+            <a:avLst/>
+          </a:prstGeom>
+        </p:spPr>
+        <p:style>
+          <a:lnRef idx="2">
+            <a:schemeClr val="accent1">
+              <a:shade val="50000"/>
+            </a:schemeClr>
+          </a:lnRef>
+          <a:fillRef idx="1">
+            <a:schemeClr val="accent1"/>
+          </a:fillRef>
+          <a:effectRef idx="0">
+            <a:schemeClr val="accent1"/>
+          </a:effectRef>
+          <a:fontRef idx="minor">
+            <a:schemeClr val="lt1"/>
+          </a:fontRef>
+        </p:style>
+        <p:txBody>
+          <a:bodyPr rtlCol="0" anchor="ctr"/>
+          <a:lstStyle/>
+          <a:p>
+            <a:pPr algn="ctr"/>
+            <a:endParaRPr lang="ko-KR" altLang="en-US"/>
+          </a:p>
+        </p:txBody>
+      </p:sp>
+      <p:sp>
+        <p:nvSpPr>
+          <p:cNvPr id="3" name="TextBox 2">
+            <a:extLst>
+              <a:ext uri="{FF2B5EF4-FFF2-40B4-BE49-F238E27FC236}">
+                <a16:creationId xmlns:a16="http://schemas.microsoft.com/office/drawing/2014/main" id="{370D99D5-CB5D-F8A1-7311-636132BE89B4}"/>
+              </a:ext>
+            </a:extLst>
+          </p:cNvPr>
+          <p:cNvSpPr txBox="1"/>
+          <p:nvPr/>
+        </p:nvSpPr>
+        <p:spPr>
+          <a:xfrm>
+            <a:off x="186080" y="202712"/>
+            <a:ext cx="2424062" cy="646331"/>
+          </a:xfrm>
+          <a:prstGeom prst="rect">
+            <a:avLst/>
+          </a:prstGeom>
+          <a:noFill/>
+        </p:spPr>
+        <p:txBody>
+          <a:bodyPr wrap="none" rtlCol="0">
+            <a:spAutoFit/>
+          </a:bodyPr>
+          <a:lstStyle/>
+          <a:p>
+            <a:r>
+              <a:rPr lang="ko-KR" altLang="en-US" sz="3600" spc="-300" dirty="0">
+                <a:solidFill>
+                  <a:schemeClr val="bg1"/>
+                </a:solidFill>
+              </a:rPr>
+              <a:t>분석 순서도</a:t>
+            </a:r>
+          </a:p>
+        </p:txBody>
+      </p:sp>
+      <p:sp>
+        <p:nvSpPr>
+          <p:cNvPr id="11" name="TextBox 10">
+            <a:extLst>
+              <a:ext uri="{FF2B5EF4-FFF2-40B4-BE49-F238E27FC236}">
+                <a16:creationId xmlns:a16="http://schemas.microsoft.com/office/drawing/2014/main" id="{6E1D0F2F-1946-1961-586D-A1591EE91709}"/>
+              </a:ext>
+            </a:extLst>
+          </p:cNvPr>
+          <p:cNvSpPr txBox="1"/>
+          <p:nvPr/>
+        </p:nvSpPr>
+        <p:spPr>
+          <a:xfrm>
+            <a:off x="339536" y="1264666"/>
+            <a:ext cx="1601721" cy="461665"/>
+          </a:xfrm>
+          <a:prstGeom prst="rect">
+            <a:avLst/>
+          </a:prstGeom>
+          <a:noFill/>
+        </p:spPr>
+        <p:txBody>
+          <a:bodyPr wrap="none" rtlCol="0">
+            <a:spAutoFit/>
+          </a:bodyPr>
+          <a:lstStyle/>
+          <a:p>
+            <a:r>
+              <a:rPr lang="ko-KR" altLang="en-US" sz="2400" spc="-300" dirty="0">
+                <a:solidFill>
+                  <a:srgbClr val="393939"/>
+                </a:solidFill>
+                <a:latin typeface="+mn-ea"/>
+              </a:rPr>
+              <a:t>분석 순서도</a:t>
+            </a:r>
+          </a:p>
+        </p:txBody>
+      </p:sp>
+      <p:sp>
+        <p:nvSpPr>
+          <p:cNvPr id="12" name="직사각형 11">
+            <a:extLst>
+              <a:ext uri="{FF2B5EF4-FFF2-40B4-BE49-F238E27FC236}">
+                <a16:creationId xmlns:a16="http://schemas.microsoft.com/office/drawing/2014/main" id="{392F0D85-5472-B788-EB2A-6313D13791B1}"/>
+              </a:ext>
+            </a:extLst>
+          </p:cNvPr>
+          <p:cNvSpPr/>
+          <p:nvPr/>
+        </p:nvSpPr>
+        <p:spPr>
+          <a:xfrm>
+            <a:off x="132080" y="1261467"/>
+            <a:ext cx="108000" cy="468000"/>
+          </a:xfrm>
+          <a:prstGeom prst="rect">
+            <a:avLst/>
+          </a:prstGeom>
+          <a:solidFill>
+            <a:schemeClr val="accent2"/>
+          </a:solidFill>
+          <a:ln>
+            <a:noFill/>
+          </a:ln>
+        </p:spPr>
+        <p:style>
+          <a:lnRef idx="2">
+            <a:schemeClr val="accent1">
+              <a:shade val="50000"/>
+            </a:schemeClr>
+          </a:lnRef>
+          <a:fillRef idx="1">
+            <a:schemeClr val="accent1"/>
+          </a:fillRef>
+          <a:effectRef idx="0">
+            <a:schemeClr val="accent1"/>
+          </a:effectRef>
+          <a:fontRef idx="minor">
+            <a:schemeClr val="lt1"/>
+          </a:fontRef>
+        </p:style>
+        <p:txBody>
+          <a:bodyPr rtlCol="0" anchor="ctr"/>
+          <a:lstStyle/>
+          <a:p>
+            <a:pPr algn="ctr"/>
+            <a:endParaRPr lang="ko-KR" altLang="en-US"/>
+          </a:p>
+        </p:txBody>
+      </p:sp>
+      <p:sp>
+        <p:nvSpPr>
+          <p:cNvPr id="15" name="TextBox 14">
+            <a:extLst>
+              <a:ext uri="{FF2B5EF4-FFF2-40B4-BE49-F238E27FC236}">
+                <a16:creationId xmlns:a16="http://schemas.microsoft.com/office/drawing/2014/main" id="{FDEBF861-EDAF-1BA2-9E15-553808EECCB7}"/>
+              </a:ext>
+            </a:extLst>
+          </p:cNvPr>
+          <p:cNvSpPr txBox="1"/>
+          <p:nvPr/>
+        </p:nvSpPr>
+        <p:spPr>
+          <a:xfrm>
+            <a:off x="132080" y="1913974"/>
+            <a:ext cx="8933715" cy="307777"/>
+          </a:xfrm>
+          <a:prstGeom prst="rect">
+            <a:avLst/>
+          </a:prstGeom>
+          <a:noFill/>
+        </p:spPr>
+        <p:txBody>
+          <a:bodyPr wrap="square" rtlCol="0">
+            <a:spAutoFit/>
+          </a:bodyPr>
+          <a:lstStyle/>
+          <a:p>
+            <a:pPr marL="228600" indent="-228600">
+              <a:buFont typeface="+mj-lt"/>
+              <a:buAutoNum type="arabicPeriod"/>
+            </a:pPr>
+            <a:r>
+              <a:rPr lang="ko-KR" altLang="en-US" sz="1400" dirty="0">
+                <a:latin typeface="+mj-ea"/>
+                <a:ea typeface="+mj-ea"/>
+              </a:rPr>
+              <a:t>아래와 같은 순서로 분석 진행</a:t>
+            </a:r>
+            <a:endParaRPr lang="en-US" altLang="ko-KR" sz="1400" dirty="0">
+              <a:latin typeface="+mj-ea"/>
+              <a:ea typeface="+mj-ea"/>
+            </a:endParaRPr>
+          </a:p>
+        </p:txBody>
+      </p:sp>
+      <p:sp>
+        <p:nvSpPr>
+          <p:cNvPr id="5" name="직사각형 4">
+            <a:extLst>
+              <a:ext uri="{FF2B5EF4-FFF2-40B4-BE49-F238E27FC236}">
+                <a16:creationId xmlns:a16="http://schemas.microsoft.com/office/drawing/2014/main" id="{278E5F77-7069-9162-CB30-BB7432B2F1C6}"/>
+              </a:ext>
+            </a:extLst>
+          </p:cNvPr>
+          <p:cNvSpPr/>
+          <p:nvPr/>
+        </p:nvSpPr>
+        <p:spPr>
+          <a:xfrm>
+            <a:off x="922287" y="2702218"/>
+            <a:ext cx="2041451" cy="3508786"/>
+          </a:xfrm>
+          <a:prstGeom prst="rect">
+            <a:avLst/>
+          </a:prstGeom>
+          <a:solidFill>
+            <a:schemeClr val="bg1">
+              <a:lumMod val="95000"/>
+            </a:schemeClr>
+          </a:solidFill>
+          <a:ln>
+            <a:noFill/>
+          </a:ln>
+        </p:spPr>
+        <p:style>
+          <a:lnRef idx="2">
+            <a:schemeClr val="accent1">
+              <a:shade val="50000"/>
+            </a:schemeClr>
+          </a:lnRef>
+          <a:fillRef idx="1">
+            <a:schemeClr val="accent1"/>
+          </a:fillRef>
+          <a:effectRef idx="0">
+            <a:schemeClr val="accent1"/>
+          </a:effectRef>
+          <a:fontRef idx="minor">
+            <a:schemeClr val="lt1"/>
+          </a:fontRef>
+        </p:style>
+        <p:txBody>
+          <a:bodyPr rtlCol="0" anchor="ctr"/>
+          <a:lstStyle/>
+          <a:p>
+            <a:pPr algn="ctr"/>
+            <a:endParaRPr lang="ko-KR" altLang="en-US">
+              <a:latin typeface="+mn-ea"/>
+            </a:endParaRPr>
+          </a:p>
+        </p:txBody>
+      </p:sp>
+      <p:sp>
+        <p:nvSpPr>
+          <p:cNvPr id="6" name="직사각형 5">
+            <a:extLst>
+              <a:ext uri="{FF2B5EF4-FFF2-40B4-BE49-F238E27FC236}">
+                <a16:creationId xmlns:a16="http://schemas.microsoft.com/office/drawing/2014/main" id="{91BE754F-A837-86BD-B8DD-5D6F58B49BC3}"/>
+              </a:ext>
+            </a:extLst>
+          </p:cNvPr>
+          <p:cNvSpPr/>
+          <p:nvPr/>
+        </p:nvSpPr>
+        <p:spPr>
+          <a:xfrm>
+            <a:off x="922287" y="2702216"/>
+            <a:ext cx="2041451" cy="604280"/>
+          </a:xfrm>
+          <a:prstGeom prst="rect">
+            <a:avLst/>
+          </a:prstGeom>
+          <a:solidFill>
+            <a:schemeClr val="accent2"/>
+          </a:solidFill>
+          <a:ln>
+            <a:noFill/>
+          </a:ln>
+        </p:spPr>
+        <p:style>
+          <a:lnRef idx="2">
+            <a:schemeClr val="accent1">
+              <a:shade val="50000"/>
+            </a:schemeClr>
+          </a:lnRef>
+          <a:fillRef idx="1">
+            <a:schemeClr val="accent1"/>
+          </a:fillRef>
+          <a:effectRef idx="0">
+            <a:schemeClr val="accent1"/>
+          </a:effectRef>
+          <a:fontRef idx="minor">
+            <a:schemeClr val="lt1"/>
+          </a:fontRef>
+        </p:style>
+        <p:txBody>
+          <a:bodyPr rtlCol="0" anchor="ctr"/>
+          <a:lstStyle/>
+          <a:p>
+            <a:pPr algn="ctr"/>
+            <a:endParaRPr lang="ko-KR" altLang="en-US">
+              <a:latin typeface="+mn-ea"/>
+            </a:endParaRPr>
+          </a:p>
+        </p:txBody>
+      </p:sp>
+      <p:sp>
+        <p:nvSpPr>
+          <p:cNvPr id="7" name="직사각형 6">
+            <a:extLst>
+              <a:ext uri="{FF2B5EF4-FFF2-40B4-BE49-F238E27FC236}">
+                <a16:creationId xmlns:a16="http://schemas.microsoft.com/office/drawing/2014/main" id="{752A04E1-5480-6B57-FB96-652337D150D7}"/>
+              </a:ext>
+            </a:extLst>
+          </p:cNvPr>
+          <p:cNvSpPr/>
+          <p:nvPr/>
+        </p:nvSpPr>
+        <p:spPr>
+          <a:xfrm>
+            <a:off x="9197962" y="2702218"/>
+            <a:ext cx="2041451" cy="3508786"/>
+          </a:xfrm>
+          <a:prstGeom prst="rect">
+            <a:avLst/>
+          </a:prstGeom>
+          <a:solidFill>
+            <a:schemeClr val="bg1">
+              <a:lumMod val="95000"/>
+            </a:schemeClr>
+          </a:solidFill>
+          <a:ln>
+            <a:noFill/>
+          </a:ln>
+        </p:spPr>
+        <p:style>
+          <a:lnRef idx="2">
+            <a:schemeClr val="accent1">
+              <a:shade val="50000"/>
+            </a:schemeClr>
+          </a:lnRef>
+          <a:fillRef idx="1">
+            <a:schemeClr val="accent1"/>
+          </a:fillRef>
+          <a:effectRef idx="0">
+            <a:schemeClr val="accent1"/>
+          </a:effectRef>
+          <a:fontRef idx="minor">
+            <a:schemeClr val="lt1"/>
+          </a:fontRef>
+        </p:style>
+        <p:txBody>
+          <a:bodyPr rtlCol="0" anchor="ctr"/>
+          <a:lstStyle/>
+          <a:p>
+            <a:pPr algn="ctr"/>
+            <a:endParaRPr lang="ko-KR" altLang="en-US">
+              <a:latin typeface="+mn-ea"/>
+            </a:endParaRPr>
+          </a:p>
+        </p:txBody>
+      </p:sp>
+      <p:sp>
+        <p:nvSpPr>
+          <p:cNvPr id="8" name="직사각형 7">
+            <a:extLst>
+              <a:ext uri="{FF2B5EF4-FFF2-40B4-BE49-F238E27FC236}">
+                <a16:creationId xmlns:a16="http://schemas.microsoft.com/office/drawing/2014/main" id="{CC155808-F1D7-5889-E1B3-30E6BA745C1F}"/>
+              </a:ext>
+            </a:extLst>
+          </p:cNvPr>
+          <p:cNvSpPr/>
+          <p:nvPr/>
+        </p:nvSpPr>
+        <p:spPr>
+          <a:xfrm>
+            <a:off x="3680845" y="2702218"/>
+            <a:ext cx="2041451" cy="3508786"/>
+          </a:xfrm>
+          <a:prstGeom prst="rect">
+            <a:avLst/>
+          </a:prstGeom>
+          <a:solidFill>
+            <a:schemeClr val="bg1">
+              <a:lumMod val="95000"/>
+            </a:schemeClr>
+          </a:solidFill>
+          <a:ln>
+            <a:noFill/>
+          </a:ln>
+        </p:spPr>
+        <p:style>
+          <a:lnRef idx="2">
+            <a:schemeClr val="accent1">
+              <a:shade val="50000"/>
+            </a:schemeClr>
+          </a:lnRef>
+          <a:fillRef idx="1">
+            <a:schemeClr val="accent1"/>
+          </a:fillRef>
+          <a:effectRef idx="0">
+            <a:schemeClr val="accent1"/>
+          </a:effectRef>
+          <a:fontRef idx="minor">
+            <a:schemeClr val="lt1"/>
+          </a:fontRef>
+        </p:style>
+        <p:txBody>
+          <a:bodyPr rtlCol="0" anchor="ctr"/>
+          <a:lstStyle/>
+          <a:p>
+            <a:pPr algn="ctr"/>
+            <a:endParaRPr lang="ko-KR" altLang="en-US">
+              <a:latin typeface="+mn-ea"/>
+            </a:endParaRPr>
+          </a:p>
+        </p:txBody>
+      </p:sp>
+      <p:sp>
+        <p:nvSpPr>
+          <p:cNvPr id="9" name="직사각형 8">
+            <a:extLst>
+              <a:ext uri="{FF2B5EF4-FFF2-40B4-BE49-F238E27FC236}">
+                <a16:creationId xmlns:a16="http://schemas.microsoft.com/office/drawing/2014/main" id="{D757B085-EEE6-1FC9-160A-B51EDE8443DD}"/>
+              </a:ext>
+            </a:extLst>
+          </p:cNvPr>
+          <p:cNvSpPr/>
+          <p:nvPr/>
+        </p:nvSpPr>
+        <p:spPr>
+          <a:xfrm>
+            <a:off x="6439403" y="2702218"/>
+            <a:ext cx="2041451" cy="3508786"/>
+          </a:xfrm>
+          <a:prstGeom prst="rect">
+            <a:avLst/>
+          </a:prstGeom>
+          <a:solidFill>
+            <a:schemeClr val="bg1">
+              <a:lumMod val="95000"/>
+            </a:schemeClr>
+          </a:solidFill>
+          <a:ln>
+            <a:noFill/>
+          </a:ln>
+        </p:spPr>
+        <p:style>
+          <a:lnRef idx="2">
+            <a:schemeClr val="accent1">
+              <a:shade val="50000"/>
+            </a:schemeClr>
+          </a:lnRef>
+          <a:fillRef idx="1">
+            <a:schemeClr val="accent1"/>
+          </a:fillRef>
+          <a:effectRef idx="0">
+            <a:schemeClr val="accent1"/>
+          </a:effectRef>
+          <a:fontRef idx="minor">
+            <a:schemeClr val="lt1"/>
+          </a:fontRef>
+        </p:style>
+        <p:txBody>
+          <a:bodyPr rtlCol="0" anchor="ctr"/>
+          <a:lstStyle/>
+          <a:p>
+            <a:pPr algn="ctr"/>
+            <a:endParaRPr lang="ko-KR" altLang="en-US">
+              <a:latin typeface="+mn-ea"/>
+            </a:endParaRPr>
+          </a:p>
+        </p:txBody>
+      </p:sp>
+      <p:sp>
+        <p:nvSpPr>
+          <p:cNvPr id="10" name="TextBox 9">
+            <a:extLst>
+              <a:ext uri="{FF2B5EF4-FFF2-40B4-BE49-F238E27FC236}">
+                <a16:creationId xmlns:a16="http://schemas.microsoft.com/office/drawing/2014/main" id="{F2896E09-8B8A-4DE0-1AAD-CCF68C3EB707}"/>
+              </a:ext>
+            </a:extLst>
+          </p:cNvPr>
+          <p:cNvSpPr txBox="1"/>
+          <p:nvPr/>
+        </p:nvSpPr>
+        <p:spPr>
+          <a:xfrm>
+            <a:off x="3127365" y="4389418"/>
+            <a:ext cx="543739" cy="400110"/>
+          </a:xfrm>
+          <a:prstGeom prst="rect">
+            <a:avLst/>
+          </a:prstGeom>
+          <a:noFill/>
+        </p:spPr>
+        <p:txBody>
+          <a:bodyPr wrap="none" rtlCol="0">
+            <a:spAutoFit/>
+          </a:bodyPr>
+          <a:lstStyle/>
+          <a:p>
+            <a:r>
+              <a:rPr lang="en-US" altLang="ko-KR" dirty="0">
+                <a:latin typeface="+mn-ea"/>
+              </a:rPr>
+              <a:t>&gt;&gt;</a:t>
+            </a:r>
+            <a:endParaRPr lang="ko-KR" altLang="en-US" dirty="0">
+              <a:latin typeface="+mn-ea"/>
+            </a:endParaRPr>
+          </a:p>
+        </p:txBody>
+      </p:sp>
+      <p:sp>
+        <p:nvSpPr>
+          <p:cNvPr id="13" name="TextBox 12">
+            <a:extLst>
+              <a:ext uri="{FF2B5EF4-FFF2-40B4-BE49-F238E27FC236}">
+                <a16:creationId xmlns:a16="http://schemas.microsoft.com/office/drawing/2014/main" id="{3E9F06CC-DC27-8371-6950-9270E13CEB29}"/>
+              </a:ext>
+            </a:extLst>
+          </p:cNvPr>
+          <p:cNvSpPr txBox="1"/>
+          <p:nvPr/>
+        </p:nvSpPr>
+        <p:spPr>
+          <a:xfrm>
+            <a:off x="5901569" y="4389418"/>
+            <a:ext cx="543739" cy="400110"/>
+          </a:xfrm>
+          <a:prstGeom prst="rect">
+            <a:avLst/>
+          </a:prstGeom>
+          <a:noFill/>
+        </p:spPr>
+        <p:txBody>
+          <a:bodyPr wrap="none" rtlCol="0">
+            <a:spAutoFit/>
+          </a:bodyPr>
+          <a:lstStyle/>
+          <a:p>
+            <a:r>
+              <a:rPr lang="en-US" altLang="ko-KR" dirty="0">
+                <a:latin typeface="+mn-ea"/>
+              </a:rPr>
+              <a:t>&gt;&gt;</a:t>
+            </a:r>
+            <a:endParaRPr lang="ko-KR" altLang="en-US" dirty="0">
+              <a:latin typeface="+mn-ea"/>
+            </a:endParaRPr>
+          </a:p>
+        </p:txBody>
+      </p:sp>
+      <p:sp>
+        <p:nvSpPr>
+          <p:cNvPr id="14" name="TextBox 13">
+            <a:extLst>
+              <a:ext uri="{FF2B5EF4-FFF2-40B4-BE49-F238E27FC236}">
+                <a16:creationId xmlns:a16="http://schemas.microsoft.com/office/drawing/2014/main" id="{C5C9DEA9-15E7-8F50-B6A3-90461BF41AD3}"/>
+              </a:ext>
+            </a:extLst>
+          </p:cNvPr>
+          <p:cNvSpPr txBox="1"/>
+          <p:nvPr/>
+        </p:nvSpPr>
+        <p:spPr>
+          <a:xfrm>
+            <a:off x="8628829" y="4389418"/>
+            <a:ext cx="543739" cy="400110"/>
+          </a:xfrm>
+          <a:prstGeom prst="rect">
+            <a:avLst/>
+          </a:prstGeom>
+          <a:noFill/>
+        </p:spPr>
+        <p:txBody>
+          <a:bodyPr wrap="none" rtlCol="0">
+            <a:spAutoFit/>
+          </a:bodyPr>
+          <a:lstStyle/>
+          <a:p>
+            <a:r>
+              <a:rPr lang="en-US" altLang="ko-KR" dirty="0">
+                <a:latin typeface="+mn-ea"/>
+              </a:rPr>
+              <a:t>&gt;&gt;</a:t>
+            </a:r>
+            <a:endParaRPr lang="ko-KR" altLang="en-US" dirty="0">
+              <a:latin typeface="+mn-ea"/>
+            </a:endParaRPr>
+          </a:p>
+        </p:txBody>
+      </p:sp>
+      <p:sp>
+        <p:nvSpPr>
+          <p:cNvPr id="16" name="TextBox 15">
+            <a:extLst>
+              <a:ext uri="{FF2B5EF4-FFF2-40B4-BE49-F238E27FC236}">
+                <a16:creationId xmlns:a16="http://schemas.microsoft.com/office/drawing/2014/main" id="{F0807D44-C9C3-6181-7B11-7BE321C61A70}"/>
+              </a:ext>
+            </a:extLst>
+          </p:cNvPr>
+          <p:cNvSpPr txBox="1"/>
+          <p:nvPr/>
+        </p:nvSpPr>
+        <p:spPr>
+          <a:xfrm>
+            <a:off x="1442393" y="2817189"/>
+            <a:ext cx="970138" cy="400110"/>
+          </a:xfrm>
+          <a:prstGeom prst="rect">
+            <a:avLst/>
+          </a:prstGeom>
+          <a:solidFill>
+            <a:schemeClr val="accent2"/>
+          </a:solidFill>
+        </p:spPr>
+        <p:txBody>
+          <a:bodyPr wrap="none" rtlCol="0">
+            <a:spAutoFit/>
+          </a:bodyPr>
+          <a:lstStyle/>
+          <a:p>
+            <a:pPr algn="ctr"/>
+            <a:r>
+              <a:rPr lang="en-US" altLang="ko-KR" dirty="0">
+                <a:solidFill>
+                  <a:schemeClr val="bg1">
+                    <a:lumMod val="95000"/>
+                  </a:schemeClr>
+                </a:solidFill>
+                <a:latin typeface="+mn-ea"/>
+              </a:rPr>
+              <a:t>STEP 1</a:t>
+            </a:r>
+            <a:endParaRPr lang="ko-KR" altLang="en-US" dirty="0">
+              <a:solidFill>
+                <a:schemeClr val="bg1">
+                  <a:lumMod val="95000"/>
+                </a:schemeClr>
+              </a:solidFill>
+              <a:latin typeface="+mn-ea"/>
+            </a:endParaRPr>
+          </a:p>
+        </p:txBody>
+      </p:sp>
+      <p:sp>
+        <p:nvSpPr>
+          <p:cNvPr id="17" name="직사각형 16">
+            <a:extLst>
+              <a:ext uri="{FF2B5EF4-FFF2-40B4-BE49-F238E27FC236}">
+                <a16:creationId xmlns:a16="http://schemas.microsoft.com/office/drawing/2014/main" id="{7FF2C7E2-65BF-E026-1B31-53F1C99C9972}"/>
+              </a:ext>
+            </a:extLst>
+          </p:cNvPr>
+          <p:cNvSpPr/>
+          <p:nvPr/>
+        </p:nvSpPr>
+        <p:spPr>
+          <a:xfrm>
+            <a:off x="3680844" y="2702216"/>
+            <a:ext cx="2041451" cy="604280"/>
+          </a:xfrm>
+          <a:prstGeom prst="rect">
+            <a:avLst/>
+          </a:prstGeom>
+          <a:solidFill>
+            <a:schemeClr val="accent2"/>
+          </a:solidFill>
+          <a:ln>
+            <a:noFill/>
+          </a:ln>
+        </p:spPr>
+        <p:style>
+          <a:lnRef idx="2">
+            <a:schemeClr val="accent1">
+              <a:shade val="50000"/>
+            </a:schemeClr>
+          </a:lnRef>
+          <a:fillRef idx="1">
+            <a:schemeClr val="accent1"/>
+          </a:fillRef>
+          <a:effectRef idx="0">
+            <a:schemeClr val="accent1"/>
+          </a:effectRef>
+          <a:fontRef idx="minor">
+            <a:schemeClr val="lt1"/>
+          </a:fontRef>
+        </p:style>
+        <p:txBody>
+          <a:bodyPr rtlCol="0" anchor="ctr"/>
+          <a:lstStyle/>
+          <a:p>
+            <a:pPr algn="ctr"/>
+            <a:endParaRPr lang="ko-KR" altLang="en-US">
+              <a:latin typeface="+mn-ea"/>
+            </a:endParaRPr>
+          </a:p>
+        </p:txBody>
+      </p:sp>
+      <p:sp>
+        <p:nvSpPr>
+          <p:cNvPr id="18" name="TextBox 17">
+            <a:extLst>
+              <a:ext uri="{FF2B5EF4-FFF2-40B4-BE49-F238E27FC236}">
+                <a16:creationId xmlns:a16="http://schemas.microsoft.com/office/drawing/2014/main" id="{1D177C19-2A1A-B42B-7E79-29D13ED6CBD1}"/>
+              </a:ext>
+            </a:extLst>
+          </p:cNvPr>
+          <p:cNvSpPr txBox="1"/>
+          <p:nvPr/>
+        </p:nvSpPr>
+        <p:spPr>
+          <a:xfrm>
+            <a:off x="4224194" y="2817189"/>
+            <a:ext cx="970138" cy="400110"/>
+          </a:xfrm>
+          <a:prstGeom prst="rect">
+            <a:avLst/>
+          </a:prstGeom>
+          <a:solidFill>
+            <a:schemeClr val="accent2"/>
+          </a:solidFill>
+        </p:spPr>
+        <p:txBody>
+          <a:bodyPr wrap="none" rtlCol="0">
+            <a:spAutoFit/>
+          </a:bodyPr>
+          <a:lstStyle/>
+          <a:p>
+            <a:pPr algn="ctr"/>
+            <a:r>
+              <a:rPr lang="en-US" altLang="ko-KR" dirty="0">
+                <a:solidFill>
+                  <a:schemeClr val="bg1">
+                    <a:lumMod val="95000"/>
+                  </a:schemeClr>
+                </a:solidFill>
+                <a:latin typeface="+mn-ea"/>
+              </a:rPr>
+              <a:t>STEP 2</a:t>
+            </a:r>
+            <a:endParaRPr lang="ko-KR" altLang="en-US" dirty="0">
+              <a:solidFill>
+                <a:schemeClr val="bg1">
+                  <a:lumMod val="95000"/>
+                </a:schemeClr>
+              </a:solidFill>
+              <a:latin typeface="+mn-ea"/>
+            </a:endParaRPr>
+          </a:p>
+        </p:txBody>
+      </p:sp>
+      <p:sp>
+        <p:nvSpPr>
+          <p:cNvPr id="19" name="직사각형 18">
+            <a:extLst>
+              <a:ext uri="{FF2B5EF4-FFF2-40B4-BE49-F238E27FC236}">
+                <a16:creationId xmlns:a16="http://schemas.microsoft.com/office/drawing/2014/main" id="{A547EC56-0E68-3BDF-1C37-B470E1554689}"/>
+              </a:ext>
+            </a:extLst>
+          </p:cNvPr>
+          <p:cNvSpPr/>
+          <p:nvPr/>
+        </p:nvSpPr>
+        <p:spPr>
+          <a:xfrm>
+            <a:off x="6439401" y="2702216"/>
+            <a:ext cx="2041451" cy="604280"/>
+          </a:xfrm>
+          <a:prstGeom prst="rect">
+            <a:avLst/>
+          </a:prstGeom>
+          <a:solidFill>
+            <a:schemeClr val="accent2"/>
+          </a:solidFill>
+          <a:ln>
+            <a:noFill/>
+          </a:ln>
+        </p:spPr>
+        <p:style>
+          <a:lnRef idx="2">
+            <a:schemeClr val="accent1">
+              <a:shade val="50000"/>
+            </a:schemeClr>
+          </a:lnRef>
+          <a:fillRef idx="1">
+            <a:schemeClr val="accent1"/>
+          </a:fillRef>
+          <a:effectRef idx="0">
+            <a:schemeClr val="accent1"/>
+          </a:effectRef>
+          <a:fontRef idx="minor">
+            <a:schemeClr val="lt1"/>
+          </a:fontRef>
+        </p:style>
+        <p:txBody>
+          <a:bodyPr rtlCol="0" anchor="ctr"/>
+          <a:lstStyle/>
+          <a:p>
+            <a:pPr algn="ctr"/>
+            <a:endParaRPr lang="ko-KR" altLang="en-US">
+              <a:latin typeface="+mn-ea"/>
+            </a:endParaRPr>
+          </a:p>
+        </p:txBody>
+      </p:sp>
+      <p:sp>
+        <p:nvSpPr>
+          <p:cNvPr id="20" name="TextBox 19">
+            <a:extLst>
+              <a:ext uri="{FF2B5EF4-FFF2-40B4-BE49-F238E27FC236}">
+                <a16:creationId xmlns:a16="http://schemas.microsoft.com/office/drawing/2014/main" id="{B6019932-0849-08F7-7E3A-D943E9932BDD}"/>
+              </a:ext>
+            </a:extLst>
+          </p:cNvPr>
+          <p:cNvSpPr txBox="1"/>
+          <p:nvPr/>
+        </p:nvSpPr>
+        <p:spPr>
+          <a:xfrm>
+            <a:off x="6983552" y="2817189"/>
+            <a:ext cx="970138" cy="400110"/>
+          </a:xfrm>
+          <a:prstGeom prst="rect">
+            <a:avLst/>
+          </a:prstGeom>
+          <a:solidFill>
+            <a:schemeClr val="accent2"/>
+          </a:solidFill>
+        </p:spPr>
+        <p:txBody>
+          <a:bodyPr wrap="none" rtlCol="0">
+            <a:spAutoFit/>
+          </a:bodyPr>
+          <a:lstStyle/>
+          <a:p>
+            <a:pPr algn="ctr"/>
+            <a:r>
+              <a:rPr lang="en-US" altLang="ko-KR" dirty="0">
+                <a:solidFill>
+                  <a:schemeClr val="bg1">
+                    <a:lumMod val="95000"/>
+                  </a:schemeClr>
+                </a:solidFill>
+                <a:latin typeface="+mn-ea"/>
+              </a:rPr>
+              <a:t>STEP 3</a:t>
+            </a:r>
+            <a:endParaRPr lang="ko-KR" altLang="en-US" dirty="0">
+              <a:solidFill>
+                <a:schemeClr val="bg1">
+                  <a:lumMod val="95000"/>
+                </a:schemeClr>
+              </a:solidFill>
+              <a:latin typeface="+mn-ea"/>
+            </a:endParaRPr>
+          </a:p>
+        </p:txBody>
+      </p:sp>
+      <p:sp>
+        <p:nvSpPr>
+          <p:cNvPr id="21" name="직사각형 20">
+            <a:extLst>
+              <a:ext uri="{FF2B5EF4-FFF2-40B4-BE49-F238E27FC236}">
+                <a16:creationId xmlns:a16="http://schemas.microsoft.com/office/drawing/2014/main" id="{3B83D832-E74F-8B15-6F70-44D9B7B0B58B}"/>
+              </a:ext>
+            </a:extLst>
+          </p:cNvPr>
+          <p:cNvSpPr/>
+          <p:nvPr/>
+        </p:nvSpPr>
+        <p:spPr>
+          <a:xfrm>
+            <a:off x="9197958" y="2702216"/>
+            <a:ext cx="2041451" cy="604280"/>
+          </a:xfrm>
+          <a:prstGeom prst="rect">
+            <a:avLst/>
+          </a:prstGeom>
+          <a:solidFill>
+            <a:schemeClr val="accent2"/>
+          </a:solidFill>
+          <a:ln>
+            <a:noFill/>
+          </a:ln>
+        </p:spPr>
+        <p:style>
+          <a:lnRef idx="2">
+            <a:schemeClr val="accent1">
+              <a:shade val="50000"/>
+            </a:schemeClr>
+          </a:lnRef>
+          <a:fillRef idx="1">
+            <a:schemeClr val="accent1"/>
+          </a:fillRef>
+          <a:effectRef idx="0">
+            <a:schemeClr val="accent1"/>
+          </a:effectRef>
+          <a:fontRef idx="minor">
+            <a:schemeClr val="lt1"/>
+          </a:fontRef>
+        </p:style>
+        <p:txBody>
+          <a:bodyPr rtlCol="0" anchor="ctr"/>
+          <a:lstStyle/>
+          <a:p>
+            <a:pPr algn="ctr"/>
+            <a:endParaRPr lang="ko-KR" altLang="en-US">
+              <a:latin typeface="+mn-ea"/>
+            </a:endParaRPr>
+          </a:p>
+        </p:txBody>
+      </p:sp>
+      <p:sp>
+        <p:nvSpPr>
+          <p:cNvPr id="22" name="TextBox 21">
+            <a:extLst>
+              <a:ext uri="{FF2B5EF4-FFF2-40B4-BE49-F238E27FC236}">
+                <a16:creationId xmlns:a16="http://schemas.microsoft.com/office/drawing/2014/main" id="{2EF3A709-BCEE-5FC5-519C-B1850E001B2D}"/>
+              </a:ext>
+            </a:extLst>
+          </p:cNvPr>
+          <p:cNvSpPr txBox="1"/>
+          <p:nvPr/>
+        </p:nvSpPr>
+        <p:spPr>
+          <a:xfrm>
+            <a:off x="9733881" y="2817189"/>
+            <a:ext cx="970138" cy="400110"/>
+          </a:xfrm>
+          <a:prstGeom prst="rect">
+            <a:avLst/>
+          </a:prstGeom>
+          <a:solidFill>
+            <a:schemeClr val="accent2"/>
+          </a:solidFill>
+        </p:spPr>
+        <p:txBody>
+          <a:bodyPr wrap="none" rtlCol="0">
+            <a:spAutoFit/>
+          </a:bodyPr>
+          <a:lstStyle/>
+          <a:p>
+            <a:pPr algn="ctr"/>
+            <a:r>
+              <a:rPr lang="en-US" altLang="ko-KR" dirty="0">
+                <a:solidFill>
+                  <a:schemeClr val="bg1">
+                    <a:lumMod val="95000"/>
+                  </a:schemeClr>
+                </a:solidFill>
+                <a:latin typeface="+mn-ea"/>
+              </a:rPr>
+              <a:t>STEP 4</a:t>
+            </a:r>
+            <a:endParaRPr lang="ko-KR" altLang="en-US" dirty="0">
+              <a:solidFill>
+                <a:schemeClr val="bg1">
+                  <a:lumMod val="95000"/>
+                </a:schemeClr>
+              </a:solidFill>
+              <a:latin typeface="+mn-ea"/>
+            </a:endParaRPr>
+          </a:p>
+        </p:txBody>
+      </p:sp>
+      <p:sp>
+        <p:nvSpPr>
+          <p:cNvPr id="23" name="TextBox 22">
+            <a:extLst>
+              <a:ext uri="{FF2B5EF4-FFF2-40B4-BE49-F238E27FC236}">
+                <a16:creationId xmlns:a16="http://schemas.microsoft.com/office/drawing/2014/main" id="{0EAA9972-4CD2-4AAA-2240-48600BA7B26D}"/>
+              </a:ext>
+            </a:extLst>
+          </p:cNvPr>
+          <p:cNvSpPr txBox="1"/>
+          <p:nvPr/>
+        </p:nvSpPr>
+        <p:spPr>
+          <a:xfrm>
+            <a:off x="1092012" y="4301078"/>
+            <a:ext cx="1682895" cy="583942"/>
+          </a:xfrm>
+          <a:prstGeom prst="rect">
+            <a:avLst/>
+          </a:prstGeom>
+          <a:noFill/>
+        </p:spPr>
+        <p:txBody>
+          <a:bodyPr wrap="square" rtlCol="0">
+            <a:spAutoFit/>
+          </a:bodyPr>
+          <a:lstStyle/>
+          <a:p>
+            <a:pPr algn="just">
+              <a:lnSpc>
+                <a:spcPct val="120000"/>
+              </a:lnSpc>
+            </a:pPr>
+            <a:r>
+              <a:rPr lang="ko-KR" altLang="en-US" sz="1400" spc="-150" dirty="0" err="1">
+                <a:solidFill>
+                  <a:schemeClr val="tx1">
+                    <a:lumMod val="75000"/>
+                    <a:lumOff val="25000"/>
+                  </a:schemeClr>
+                </a:solidFill>
+                <a:latin typeface="+mn-ea"/>
+              </a:rPr>
+              <a:t>크롤링</a:t>
+            </a:r>
+            <a:r>
+              <a:rPr lang="en-US" altLang="ko-KR" sz="1400" spc="-150" dirty="0">
+                <a:solidFill>
+                  <a:schemeClr val="tx1">
+                    <a:lumMod val="75000"/>
+                    <a:lumOff val="25000"/>
+                  </a:schemeClr>
+                </a:solidFill>
+                <a:latin typeface="+mn-ea"/>
+              </a:rPr>
+              <a:t>, API </a:t>
+            </a:r>
+            <a:r>
+              <a:rPr lang="ko-KR" altLang="en-US" sz="1400" spc="-150" dirty="0">
+                <a:solidFill>
+                  <a:schemeClr val="tx1">
+                    <a:lumMod val="75000"/>
+                    <a:lumOff val="25000"/>
+                  </a:schemeClr>
+                </a:solidFill>
+                <a:latin typeface="+mn-ea"/>
+              </a:rPr>
+              <a:t>등의 경로를 통한 데이터 수집</a:t>
+            </a:r>
+          </a:p>
+        </p:txBody>
+      </p:sp>
+      <p:sp>
+        <p:nvSpPr>
+          <p:cNvPr id="24" name="TextBox 23">
+            <a:extLst>
+              <a:ext uri="{FF2B5EF4-FFF2-40B4-BE49-F238E27FC236}">
+                <a16:creationId xmlns:a16="http://schemas.microsoft.com/office/drawing/2014/main" id="{8004FDFC-7E41-09C2-FB35-DC78845CDB9F}"/>
+              </a:ext>
+            </a:extLst>
+          </p:cNvPr>
+          <p:cNvSpPr txBox="1"/>
+          <p:nvPr/>
+        </p:nvSpPr>
+        <p:spPr>
+          <a:xfrm>
+            <a:off x="3850570" y="3797022"/>
+            <a:ext cx="1758627" cy="1359539"/>
+          </a:xfrm>
+          <a:prstGeom prst="rect">
+            <a:avLst/>
+          </a:prstGeom>
+          <a:noFill/>
+        </p:spPr>
+        <p:txBody>
+          <a:bodyPr wrap="square" rtlCol="0">
+            <a:spAutoFit/>
+          </a:bodyPr>
+          <a:lstStyle/>
+          <a:p>
+            <a:pPr algn="just">
+              <a:lnSpc>
+                <a:spcPct val="120000"/>
+              </a:lnSpc>
+            </a:pPr>
+            <a:r>
+              <a:rPr lang="en-US" altLang="ko-KR" sz="1400" spc="-150" dirty="0">
+                <a:solidFill>
+                  <a:schemeClr val="tx1">
+                    <a:lumMod val="75000"/>
+                    <a:lumOff val="25000"/>
+                  </a:schemeClr>
+                </a:solidFill>
+                <a:latin typeface="+mn-ea"/>
+              </a:rPr>
+              <a:t>EDA</a:t>
+            </a:r>
+            <a:r>
+              <a:rPr lang="ko-KR" altLang="en-US" sz="1400" spc="-150" dirty="0">
+                <a:solidFill>
+                  <a:schemeClr val="tx1">
+                    <a:lumMod val="75000"/>
+                    <a:lumOff val="25000"/>
+                  </a:schemeClr>
+                </a:solidFill>
+                <a:latin typeface="+mn-ea"/>
+              </a:rPr>
+              <a:t>를 통한 수집한 데이터의 </a:t>
+            </a:r>
+            <a:r>
+              <a:rPr lang="en-US" altLang="ko-KR" sz="1400" spc="-150" dirty="0">
+                <a:solidFill>
+                  <a:schemeClr val="tx1">
+                    <a:lumMod val="75000"/>
+                    <a:lumOff val="25000"/>
+                  </a:schemeClr>
+                </a:solidFill>
+                <a:latin typeface="+mn-ea"/>
+              </a:rPr>
+              <a:t>1</a:t>
+            </a:r>
+            <a:r>
+              <a:rPr lang="ko-KR" altLang="en-US" sz="1400" spc="-150" dirty="0">
+                <a:solidFill>
+                  <a:schemeClr val="tx1">
+                    <a:lumMod val="75000"/>
+                    <a:lumOff val="25000"/>
+                  </a:schemeClr>
+                </a:solidFill>
+                <a:latin typeface="+mn-ea"/>
+              </a:rPr>
+              <a:t>차 분석</a:t>
+            </a:r>
+            <a:r>
+              <a:rPr lang="en-US" altLang="ko-KR" sz="1400" spc="-150" dirty="0">
+                <a:solidFill>
+                  <a:schemeClr val="tx1">
+                    <a:lumMod val="75000"/>
+                    <a:lumOff val="25000"/>
+                  </a:schemeClr>
+                </a:solidFill>
+                <a:latin typeface="+mn-ea"/>
+              </a:rPr>
+              <a:t>, </a:t>
+            </a:r>
+            <a:r>
+              <a:rPr lang="ko-KR" altLang="en-US" sz="1400" spc="-150" dirty="0">
+                <a:solidFill>
+                  <a:schemeClr val="tx1">
+                    <a:lumMod val="75000"/>
+                    <a:lumOff val="25000"/>
+                  </a:schemeClr>
+                </a:solidFill>
+                <a:latin typeface="+mn-ea"/>
+              </a:rPr>
+              <a:t>분석 결과를 통한 </a:t>
+            </a:r>
+            <a:r>
+              <a:rPr lang="ko-KR" altLang="en-US" sz="1400" spc="-150" dirty="0" err="1">
+                <a:solidFill>
+                  <a:schemeClr val="tx1">
+                    <a:lumMod val="75000"/>
+                    <a:lumOff val="25000"/>
+                  </a:schemeClr>
+                </a:solidFill>
+                <a:latin typeface="+mn-ea"/>
+              </a:rPr>
+              <a:t>전처리</a:t>
+            </a:r>
+            <a:r>
+              <a:rPr lang="ko-KR" altLang="en-US" sz="1400" spc="-150" dirty="0">
+                <a:solidFill>
+                  <a:schemeClr val="tx1">
+                    <a:lumMod val="75000"/>
+                    <a:lumOff val="25000"/>
+                  </a:schemeClr>
+                </a:solidFill>
+                <a:latin typeface="+mn-ea"/>
+              </a:rPr>
+              <a:t> 방법 결정 및 데이터 </a:t>
+            </a:r>
+            <a:r>
+              <a:rPr lang="ko-KR" altLang="en-US" sz="1400" spc="-150" dirty="0" err="1">
+                <a:solidFill>
+                  <a:schemeClr val="tx1">
+                    <a:lumMod val="75000"/>
+                    <a:lumOff val="25000"/>
+                  </a:schemeClr>
+                </a:solidFill>
+                <a:latin typeface="+mn-ea"/>
+              </a:rPr>
+              <a:t>전처리</a:t>
+            </a:r>
+            <a:r>
+              <a:rPr lang="ko-KR" altLang="en-US" sz="1400" spc="-150" dirty="0">
+                <a:solidFill>
+                  <a:schemeClr val="tx1">
+                    <a:lumMod val="75000"/>
+                    <a:lumOff val="25000"/>
+                  </a:schemeClr>
+                </a:solidFill>
+                <a:latin typeface="+mn-ea"/>
+              </a:rPr>
+              <a:t> 진행</a:t>
+            </a:r>
+          </a:p>
+        </p:txBody>
+      </p:sp>
+      <p:sp>
+        <p:nvSpPr>
+          <p:cNvPr id="25" name="TextBox 24">
+            <a:extLst>
+              <a:ext uri="{FF2B5EF4-FFF2-40B4-BE49-F238E27FC236}">
+                <a16:creationId xmlns:a16="http://schemas.microsoft.com/office/drawing/2014/main" id="{3D31B3D8-B632-95E9-9AFA-CECAFDF50455}"/>
+              </a:ext>
+            </a:extLst>
+          </p:cNvPr>
+          <p:cNvSpPr txBox="1"/>
+          <p:nvPr/>
+        </p:nvSpPr>
+        <p:spPr>
+          <a:xfrm>
+            <a:off x="6609129" y="4085054"/>
+            <a:ext cx="1682895" cy="842475"/>
+          </a:xfrm>
+          <a:prstGeom prst="rect">
+            <a:avLst/>
+          </a:prstGeom>
+          <a:noFill/>
+        </p:spPr>
+        <p:txBody>
+          <a:bodyPr wrap="square" rtlCol="0">
+            <a:spAutoFit/>
+          </a:bodyPr>
+          <a:lstStyle/>
+          <a:p>
+            <a:pPr algn="just">
+              <a:lnSpc>
+                <a:spcPct val="120000"/>
+              </a:lnSpc>
+            </a:pPr>
+            <a:r>
+              <a:rPr lang="ko-KR" altLang="en-US" sz="1400" spc="-150" dirty="0">
+                <a:solidFill>
+                  <a:schemeClr val="tx1">
+                    <a:lumMod val="75000"/>
+                    <a:lumOff val="25000"/>
+                  </a:schemeClr>
+                </a:solidFill>
+                <a:latin typeface="+mn-ea"/>
+              </a:rPr>
+              <a:t>전처리를 진행한 데이터에 대한 </a:t>
+            </a:r>
+            <a:r>
+              <a:rPr lang="ko-KR" altLang="en-US" sz="1400" spc="-150" dirty="0" err="1">
+                <a:solidFill>
+                  <a:schemeClr val="tx1">
+                    <a:lumMod val="75000"/>
+                    <a:lumOff val="25000"/>
+                  </a:schemeClr>
+                </a:solidFill>
+                <a:latin typeface="+mn-ea"/>
+              </a:rPr>
+              <a:t>머신러닝</a:t>
+            </a:r>
+            <a:r>
+              <a:rPr lang="ko-KR" altLang="en-US" sz="1400" spc="-150" dirty="0">
+                <a:solidFill>
+                  <a:schemeClr val="tx1">
+                    <a:lumMod val="75000"/>
+                    <a:lumOff val="25000"/>
+                  </a:schemeClr>
+                </a:solidFill>
+                <a:latin typeface="+mn-ea"/>
+              </a:rPr>
+              <a:t> 모델 훈련</a:t>
+            </a:r>
+          </a:p>
+        </p:txBody>
+      </p:sp>
+      <p:sp>
+        <p:nvSpPr>
+          <p:cNvPr id="26" name="TextBox 25">
+            <a:extLst>
+              <a:ext uri="{FF2B5EF4-FFF2-40B4-BE49-F238E27FC236}">
+                <a16:creationId xmlns:a16="http://schemas.microsoft.com/office/drawing/2014/main" id="{8C39C934-16F8-49CA-BF8D-ACECD22AAB31}"/>
+              </a:ext>
+            </a:extLst>
+          </p:cNvPr>
+          <p:cNvSpPr txBox="1"/>
+          <p:nvPr/>
+        </p:nvSpPr>
+        <p:spPr>
+          <a:xfrm>
+            <a:off x="9377235" y="3938898"/>
+            <a:ext cx="1682895" cy="583942"/>
+          </a:xfrm>
+          <a:prstGeom prst="rect">
+            <a:avLst/>
+          </a:prstGeom>
+          <a:noFill/>
+        </p:spPr>
+        <p:txBody>
+          <a:bodyPr wrap="square" rtlCol="0">
+            <a:spAutoFit/>
+          </a:bodyPr>
+          <a:lstStyle/>
+          <a:p>
+            <a:pPr algn="just">
+              <a:lnSpc>
+                <a:spcPct val="120000"/>
+              </a:lnSpc>
+            </a:pPr>
+            <a:r>
+              <a:rPr lang="ko-KR" altLang="en-US" sz="1400" spc="-150" dirty="0">
+                <a:solidFill>
+                  <a:schemeClr val="tx1">
+                    <a:lumMod val="75000"/>
+                    <a:lumOff val="25000"/>
+                  </a:schemeClr>
+                </a:solidFill>
+                <a:latin typeface="+mn-ea"/>
+              </a:rPr>
+              <a:t>모델 성능 평가 및 최종 결론 도출</a:t>
             </a:r>
           </a:p>
         </p:txBody>
@@ -10673,8 +12026,8 @@
         </p:nvSpPr>
         <p:spPr>
           <a:xfrm>
-            <a:off x="132080" y="1913974"/>
-            <a:ext cx="8933715" cy="1169551"/>
+            <a:off x="339536" y="1914990"/>
+            <a:ext cx="4644457" cy="2246769"/>
           </a:xfrm>
           <a:prstGeom prst="rect">
             <a:avLst/>
@@ -10726,6 +12079,20 @@
               </a:rPr>
               <a:t>데이터 전처리로 인한 원본 데이터 불필요 등의 사유로 일부 변수는 사용하지 않음</a:t>
             </a:r>
+            <a:r>
+              <a:rPr lang="en-US" altLang="ko-KR" sz="1400" dirty="0">
+                <a:latin typeface="+mj-ea"/>
+                <a:ea typeface="+mj-ea"/>
+              </a:rPr>
+              <a:t>. </a:t>
+            </a:r>
+            <a:r>
+              <a:rPr lang="ko-KR" altLang="en-US" sz="1400" dirty="0">
+                <a:latin typeface="+mj-ea"/>
+                <a:ea typeface="+mj-ea"/>
+              </a:rPr>
+              <a:t>추가적으로 선행 연구를 통하여 산재 예측에 유의미한 영향을 주는 것으로 판단되는 변수 선택</a:t>
+            </a:r>
             <a:endParaRPr lang="en-US" altLang="ko-KR" sz="1400" dirty="0">
               <a:latin typeface="+mj-ea"/>
               <a:ea typeface="+mj-ea"/>
@@ -10746,409 +12113,88 @@
               <a:buFont typeface="+mj-lt"/>
               <a:buAutoNum type="arabicPeriod"/>
             </a:pPr>
-            <a:r>
-              <a:rPr lang="ko-KR" altLang="en-US" sz="1400" dirty="0">
-                <a:latin typeface="+mj-ea"/>
-                <a:ea typeface="+mj-ea"/>
-              </a:rPr>
-              <a:t>동일한 데이터이지만 수집 기준이 다를 경우 </a:t>
-            </a:r>
-            <a:r>
-              <a:rPr lang="en-US" altLang="ko-KR" sz="1400" dirty="0">
-                <a:latin typeface="+mj-ea"/>
-                <a:ea typeface="+mj-ea"/>
-              </a:rPr>
-              <a:t>(</a:t>
-            </a:r>
-            <a:r>
-              <a:rPr lang="ko-KR" altLang="en-US" sz="1400" dirty="0">
-                <a:latin typeface="+mj-ea"/>
-                <a:ea typeface="+mj-ea"/>
-              </a:rPr>
-              <a:t>국도교통부와 기상청에서 각각 제공하는 기온 데이터</a:t>
-            </a:r>
-            <a:r>
-              <a:rPr lang="en-US" altLang="ko-KR" sz="1400" dirty="0">
-                <a:latin typeface="+mj-ea"/>
-                <a:ea typeface="+mj-ea"/>
-              </a:rPr>
-              <a:t>) </a:t>
-            </a:r>
-            <a:r>
-              <a:rPr lang="ko-KR" altLang="en-US" sz="1400" dirty="0">
-                <a:latin typeface="+mj-ea"/>
-                <a:ea typeface="+mj-ea"/>
-              </a:rPr>
-              <a:t>한쪽은 제외</a:t>
-            </a:r>
             <a:endParaRPr lang="en-US" altLang="ko-KR" sz="1400" dirty="0">
               <a:latin typeface="+mj-ea"/>
               <a:ea typeface="+mj-ea"/>
             </a:endParaRPr>
           </a:p>
+          <a:p>
+            <a:pPr marL="228600" indent="-228600">
+              <a:buFont typeface="+mj-lt"/>
+              <a:buAutoNum type="arabicPeriod"/>
+            </a:pPr>
+            <a:r>
+              <a:rPr lang="ko-KR" altLang="en-US" sz="1400" dirty="0">
+                <a:latin typeface="+mj-ea"/>
+                <a:ea typeface="+mj-ea"/>
+              </a:rPr>
+              <a:t>동일한 데이터이지만 수집 기준이 다를 경우 </a:t>
+            </a:r>
+            <a:r>
+              <a:rPr lang="en-US" altLang="ko-KR" sz="1400" dirty="0">
+                <a:latin typeface="+mj-ea"/>
+                <a:ea typeface="+mj-ea"/>
+              </a:rPr>
+              <a:t>(</a:t>
+            </a:r>
+            <a:r>
+              <a:rPr lang="ko-KR" altLang="en-US" sz="1400" dirty="0">
+                <a:latin typeface="+mj-ea"/>
+                <a:ea typeface="+mj-ea"/>
+              </a:rPr>
+              <a:t>국도교통부와 기상청에서 각각 제공하는 기온 데이터</a:t>
+            </a:r>
+            <a:r>
+              <a:rPr lang="en-US" altLang="ko-KR" sz="1400" dirty="0">
+                <a:latin typeface="+mj-ea"/>
+                <a:ea typeface="+mj-ea"/>
+              </a:rPr>
+              <a:t>) </a:t>
+            </a:r>
+            <a:r>
+              <a:rPr lang="ko-KR" altLang="en-US" sz="1400" dirty="0">
+                <a:latin typeface="+mj-ea"/>
+                <a:ea typeface="+mj-ea"/>
+              </a:rPr>
+              <a:t>한쪽은 제외</a:t>
+            </a:r>
+            <a:endParaRPr lang="en-US" altLang="ko-KR" sz="1400" dirty="0">
+              <a:latin typeface="+mj-ea"/>
+              <a:ea typeface="+mj-ea"/>
+            </a:endParaRPr>
+          </a:p>
         </p:txBody>
       </p:sp>
-      <p:sp>
-        <p:nvSpPr>
-          <p:cNvPr id="4" name="TextBox 3">
+      <p:pic>
+        <p:nvPicPr>
+          <p:cNvPr id="9" name="그림 8">
             <a:extLst>
               <a:ext uri="{FF2B5EF4-FFF2-40B4-BE49-F238E27FC236}">
-                <a16:creationId xmlns:a16="http://schemas.microsoft.com/office/drawing/2014/main" id="{93F65D7C-E114-1C6B-7DC5-BC68E31FB77C}"/>
+                <a16:creationId xmlns:a16="http://schemas.microsoft.com/office/drawing/2014/main" id="{223D544E-725E-FDB1-723A-198771892191}"/>
               </a:ext>
             </a:extLst>
           </p:cNvPr>
-          <p:cNvSpPr txBox="1"/>
+          <p:cNvPicPr>
+            <a:picLocks noChangeAspect="1"/>
+          </p:cNvPicPr>
           <p:nvPr/>
-        </p:nvSpPr>
+        </p:nvPicPr>
+        <p:blipFill>
+          <a:blip r:embed="rId2"/>
+          <a:stretch>
+            <a:fillRect/>
+          </a:stretch>
+        </p:blipFill>
         <p:spPr>
           <a:xfrm>
-            <a:off x="393536" y="3612829"/>
-            <a:ext cx="5344733" cy="461665"/>
+            <a:off x="6021806" y="1527808"/>
+            <a:ext cx="5565964" cy="4816538"/>
           </a:xfrm>
           <a:prstGeom prst="rect">
             <a:avLst/>
           </a:prstGeom>
-          <a:noFill/>
         </p:spPr>
-        <p:txBody>
-          <a:bodyPr wrap="none" rtlCol="0">
-            <a:spAutoFit/>
-          </a:bodyPr>
-          <a:lstStyle/>
-          <a:p>
-            <a:r>
-              <a:rPr lang="ko-KR" altLang="en-US" sz="2400" spc="-300" dirty="0">
-                <a:solidFill>
-                  <a:srgbClr val="393939"/>
-                </a:solidFill>
-                <a:latin typeface="+mn-ea"/>
-              </a:rPr>
-              <a:t>데이터 </a:t>
-            </a:r>
-            <a:r>
-              <a:rPr lang="ko-KR" altLang="en-US" sz="2400" spc="-300" dirty="0" err="1">
-                <a:solidFill>
-                  <a:srgbClr val="393939"/>
-                </a:solidFill>
-                <a:latin typeface="+mn-ea"/>
-              </a:rPr>
-              <a:t>전처리</a:t>
-            </a:r>
-            <a:r>
-              <a:rPr lang="ko-KR" altLang="en-US" sz="2400" spc="-300" dirty="0">
-                <a:solidFill>
-                  <a:srgbClr val="393939"/>
-                </a:solidFill>
-                <a:latin typeface="+mn-ea"/>
-              </a:rPr>
-              <a:t> </a:t>
-            </a:r>
-            <a:r>
-              <a:rPr lang="en-US" altLang="ko-KR" sz="2400" spc="-300" dirty="0">
-                <a:solidFill>
-                  <a:srgbClr val="393939"/>
-                </a:solidFill>
-                <a:latin typeface="+mn-ea"/>
-              </a:rPr>
-              <a:t>- </a:t>
-            </a:r>
-            <a:r>
-              <a:rPr lang="ko-KR" altLang="en-US" sz="2400" spc="-300" dirty="0">
-                <a:solidFill>
-                  <a:srgbClr val="393939"/>
-                </a:solidFill>
-                <a:latin typeface="+mn-ea"/>
-              </a:rPr>
-              <a:t>범주형 데이터 </a:t>
-            </a:r>
-            <a:r>
-              <a:rPr lang="ko-KR" altLang="en-US" sz="2400" spc="-300" dirty="0" err="1">
-                <a:solidFill>
-                  <a:srgbClr val="393939"/>
-                </a:solidFill>
-                <a:latin typeface="+mn-ea"/>
-              </a:rPr>
-              <a:t>재분류</a:t>
-            </a:r>
-            <a:r>
-              <a:rPr lang="ko-KR" altLang="en-US" sz="2400" spc="-300" dirty="0">
-                <a:solidFill>
-                  <a:srgbClr val="393939"/>
-                </a:solidFill>
-                <a:latin typeface="+mn-ea"/>
-              </a:rPr>
-              <a:t> 과정 </a:t>
-            </a:r>
-          </a:p>
-        </p:txBody>
-      </p:sp>
-      <p:sp>
-        <p:nvSpPr>
-          <p:cNvPr id="5" name="TextBox 4">
-            <a:extLst>
-              <a:ext uri="{FF2B5EF4-FFF2-40B4-BE49-F238E27FC236}">
-                <a16:creationId xmlns:a16="http://schemas.microsoft.com/office/drawing/2014/main" id="{64A98D59-23F6-4A33-1CC0-DBE24AC7CE25}"/>
-              </a:ext>
-            </a:extLst>
-          </p:cNvPr>
-          <p:cNvSpPr txBox="1"/>
-          <p:nvPr/>
-        </p:nvSpPr>
-        <p:spPr>
-          <a:xfrm>
-            <a:off x="186080" y="4262137"/>
-            <a:ext cx="8933715" cy="1169551"/>
-          </a:xfrm>
-          <a:prstGeom prst="rect">
-            <a:avLst/>
-          </a:prstGeom>
-          <a:noFill/>
-        </p:spPr>
-        <p:txBody>
-          <a:bodyPr wrap="square" rtlCol="0">
-            <a:spAutoFit/>
-          </a:bodyPr>
-          <a:lstStyle/>
-          <a:p>
-            <a:pPr marL="228600" indent="-228600">
-              <a:buFont typeface="+mj-lt"/>
-              <a:buAutoNum type="arabicPeriod"/>
-            </a:pPr>
-            <a:r>
-              <a:rPr lang="ko-KR" altLang="en-US" sz="1400" dirty="0">
-                <a:latin typeface="+mj-ea"/>
-                <a:ea typeface="+mj-ea"/>
-              </a:rPr>
-              <a:t>개수가 매우 적어 분석에 유의미한 영향을 주지 않는 범주형 변수는 </a:t>
-            </a:r>
-            <a:r>
-              <a:rPr lang="en-US" altLang="ko-KR" sz="1400" dirty="0">
-                <a:latin typeface="+mj-ea"/>
-                <a:ea typeface="+mj-ea"/>
-              </a:rPr>
-              <a:t>‘</a:t>
-            </a:r>
-            <a:r>
-              <a:rPr lang="ko-KR" altLang="en-US" sz="1400" dirty="0">
-                <a:latin typeface="+mj-ea"/>
-                <a:ea typeface="+mj-ea"/>
-              </a:rPr>
-              <a:t>기타</a:t>
-            </a:r>
-            <a:r>
-              <a:rPr lang="en-US" altLang="ko-KR" sz="1400" dirty="0">
-                <a:latin typeface="+mj-ea"/>
-                <a:ea typeface="+mj-ea"/>
-              </a:rPr>
-              <a:t>‘ </a:t>
-            </a:r>
-            <a:r>
-              <a:rPr lang="ko-KR" altLang="en-US" sz="1400" dirty="0">
-                <a:latin typeface="+mj-ea"/>
-                <a:ea typeface="+mj-ea"/>
-              </a:rPr>
-              <a:t>구분으로 통합하여 데이터 불균형 해소</a:t>
-            </a:r>
-            <a:endParaRPr lang="en-US" altLang="ko-KR" sz="1400" dirty="0">
-              <a:latin typeface="+mj-ea"/>
-              <a:ea typeface="+mj-ea"/>
-            </a:endParaRPr>
-          </a:p>
-          <a:p>
-            <a:pPr marL="228600" indent="-228600">
-              <a:buFont typeface="+mj-lt"/>
-              <a:buAutoNum type="arabicPeriod"/>
-            </a:pPr>
-            <a:endParaRPr lang="en-US" altLang="ko-KR" sz="1400" dirty="0">
-              <a:latin typeface="+mj-ea"/>
-              <a:ea typeface="+mj-ea"/>
-            </a:endParaRPr>
-          </a:p>
-          <a:p>
-            <a:pPr marL="228600" indent="-228600">
-              <a:buFont typeface="+mj-lt"/>
-              <a:buAutoNum type="arabicPeriod"/>
-            </a:pPr>
-            <a:r>
-              <a:rPr lang="ko-KR" altLang="en-US" sz="1400" dirty="0">
-                <a:latin typeface="+mj-ea"/>
-                <a:ea typeface="+mj-ea"/>
-              </a:rPr>
-              <a:t>단일 컬럼 내에서 </a:t>
-            </a:r>
-            <a:r>
-              <a:rPr lang="en-US" altLang="ko-KR" sz="1400" dirty="0">
-                <a:latin typeface="+mj-ea"/>
-                <a:ea typeface="+mj-ea"/>
-              </a:rPr>
-              <a:t>‘</a:t>
-            </a:r>
-            <a:r>
-              <a:rPr lang="ko-KR" altLang="en-US" sz="1400" dirty="0">
-                <a:latin typeface="+mj-ea"/>
-                <a:ea typeface="+mj-ea"/>
-              </a:rPr>
-              <a:t>기타</a:t>
-            </a:r>
-            <a:r>
-              <a:rPr lang="en-US" altLang="ko-KR" sz="1400" dirty="0">
-                <a:latin typeface="+mj-ea"/>
-                <a:ea typeface="+mj-ea"/>
-              </a:rPr>
-              <a:t>‘ </a:t>
-            </a:r>
-            <a:r>
-              <a:rPr lang="ko-KR" altLang="en-US" sz="1400" dirty="0">
-                <a:latin typeface="+mj-ea"/>
-                <a:ea typeface="+mj-ea"/>
-              </a:rPr>
-              <a:t>로 분류할 개수의 기준은 해당 컬럼 내 데이터의 균형 상태를 확인하여 유동적으로 결정</a:t>
-            </a:r>
-            <a:endParaRPr lang="en-US" altLang="ko-KR" sz="1400" dirty="0">
-              <a:latin typeface="+mj-ea"/>
-              <a:ea typeface="+mj-ea"/>
-            </a:endParaRPr>
-          </a:p>
-        </p:txBody>
-      </p:sp>
-      <p:sp>
-        <p:nvSpPr>
-          <p:cNvPr id="6" name="TextBox 5">
-            <a:extLst>
-              <a:ext uri="{FF2B5EF4-FFF2-40B4-BE49-F238E27FC236}">
-                <a16:creationId xmlns:a16="http://schemas.microsoft.com/office/drawing/2014/main" id="{279A8E29-2F13-0662-D858-85A08C916C62}"/>
-              </a:ext>
-            </a:extLst>
-          </p:cNvPr>
-          <p:cNvSpPr txBox="1"/>
-          <p:nvPr/>
-        </p:nvSpPr>
-        <p:spPr>
-          <a:xfrm>
-            <a:off x="886716" y="2875839"/>
-            <a:ext cx="3743332" cy="369332"/>
-          </a:xfrm>
-          <a:prstGeom prst="rect">
-            <a:avLst/>
-          </a:prstGeom>
-          <a:noFill/>
-        </p:spPr>
-        <p:txBody>
-          <a:bodyPr wrap="none" rtlCol="0">
-            <a:spAutoFit/>
-          </a:bodyPr>
-          <a:lstStyle/>
-          <a:p>
-            <a:r>
-              <a:rPr lang="ko-KR" altLang="en-US" dirty="0">
-                <a:solidFill>
-                  <a:srgbClr val="FF0000"/>
-                </a:solidFill>
-              </a:rPr>
-              <a:t>양측 기온 데이터 시각적으로 제시</a:t>
-            </a:r>
-          </a:p>
-        </p:txBody>
-      </p:sp>
-      <p:sp>
-        <p:nvSpPr>
-          <p:cNvPr id="7" name="TextBox 6">
-            <a:extLst>
-              <a:ext uri="{FF2B5EF4-FFF2-40B4-BE49-F238E27FC236}">
-                <a16:creationId xmlns:a16="http://schemas.microsoft.com/office/drawing/2014/main" id="{323E54B8-6E7A-2846-F6A6-3B70C4FD7351}"/>
-              </a:ext>
-            </a:extLst>
-          </p:cNvPr>
-          <p:cNvSpPr txBox="1"/>
-          <p:nvPr/>
-        </p:nvSpPr>
-        <p:spPr>
-          <a:xfrm>
-            <a:off x="1005744" y="5247022"/>
-            <a:ext cx="3643946" cy="369332"/>
-          </a:xfrm>
-          <a:prstGeom prst="rect">
-            <a:avLst/>
-          </a:prstGeom>
-          <a:noFill/>
-        </p:spPr>
-        <p:txBody>
-          <a:bodyPr wrap="none" rtlCol="0">
-            <a:spAutoFit/>
-          </a:bodyPr>
-          <a:lstStyle/>
-          <a:p>
-            <a:r>
-              <a:rPr lang="ko-KR" altLang="en-US" dirty="0">
-                <a:solidFill>
-                  <a:srgbClr val="FF0000"/>
-                </a:solidFill>
-              </a:rPr>
-              <a:t>특정 컬럼의 </a:t>
-            </a:r>
-            <a:r>
-              <a:rPr lang="en-US" altLang="ko-KR" dirty="0">
-                <a:solidFill>
-                  <a:srgbClr val="FF0000"/>
-                </a:solidFill>
-              </a:rPr>
-              <a:t>count</a:t>
-            </a:r>
-            <a:r>
-              <a:rPr lang="ko-KR" altLang="en-US" dirty="0">
-                <a:solidFill>
-                  <a:srgbClr val="FF0000"/>
-                </a:solidFill>
-              </a:rPr>
-              <a:t>을 예시로 제시</a:t>
-            </a:r>
-          </a:p>
-        </p:txBody>
-      </p:sp>
-      <p:sp>
-        <p:nvSpPr>
-          <p:cNvPr id="8" name="TextBox 7">
-            <a:extLst>
-              <a:ext uri="{FF2B5EF4-FFF2-40B4-BE49-F238E27FC236}">
-                <a16:creationId xmlns:a16="http://schemas.microsoft.com/office/drawing/2014/main" id="{4D00DB20-3968-F148-7642-4B5349CDF5BB}"/>
-              </a:ext>
-            </a:extLst>
-          </p:cNvPr>
-          <p:cNvSpPr txBox="1"/>
-          <p:nvPr/>
-        </p:nvSpPr>
-        <p:spPr>
-          <a:xfrm>
-            <a:off x="4269595" y="2168091"/>
-            <a:ext cx="3825086" cy="369332"/>
-          </a:xfrm>
-          <a:prstGeom prst="rect">
-            <a:avLst/>
-          </a:prstGeom>
-          <a:noFill/>
-        </p:spPr>
-        <p:txBody>
-          <a:bodyPr wrap="none" rtlCol="0">
-            <a:spAutoFit/>
-          </a:bodyPr>
-          <a:lstStyle/>
-          <a:p>
-            <a:r>
-              <a:rPr lang="ko-KR" altLang="en-US">
-                <a:solidFill>
-                  <a:srgbClr val="FF0000"/>
-                </a:solidFill>
-              </a:rPr>
-              <a:t>데이터 선정 기준은 전문 자료 활용</a:t>
-            </a:r>
-            <a:endParaRPr lang="ko-KR" altLang="en-US" dirty="0">
-              <a:solidFill>
-                <a:srgbClr val="FF0000"/>
-              </a:solidFill>
-            </a:endParaRPr>
-          </a:p>
-        </p:txBody>
-      </p:sp>
+      </p:pic>
     </p:spTree>
     <p:extLst>
       <p:ext uri="{BB962C8B-B14F-4D97-AF65-F5344CB8AC3E}">
@@ -11258,7 +12304,7 @@
         <p:spPr>
           <a:xfrm>
             <a:off x="186080" y="202712"/>
-            <a:ext cx="3121367" cy="646331"/>
+            <a:ext cx="5210081" cy="646331"/>
           </a:xfrm>
           <a:prstGeom prst="rect">
             <a:avLst/>
@@ -11277,24 +12323,21 @@
                   <a:schemeClr val="bg1"/>
                 </a:solidFill>
               </a:rPr>
-              <a:t>모델링 </a:t>
-            </a:r>
-            <a:r>
-              <a:rPr lang="en-US" altLang="ko-KR" sz="3600" spc="-300" dirty="0">
+              <a:t>변수 선택과 데이터 </a:t>
+            </a:r>
+            <a:r>
+              <a:rPr lang="ko-KR" altLang="en-US" sz="3600" spc="-300" dirty="0" err="1">
                 <a:solidFill>
                   <a:schemeClr val="bg1"/>
                 </a:solidFill>
               </a:rPr>
-              <a:t>- </a:t>
-            </a:r>
-            <a:r>
-              <a:rPr lang="ko-KR" altLang="en-US" sz="3600" spc="-300" dirty="0">
-                <a:solidFill>
-                  <a:schemeClr val="bg1"/>
-                </a:solidFill>
-              </a:rPr>
-              <a:t>앙상블</a:t>
-            </a:r>
+              <a:t>전처리</a:t>
+            </a:r>
+            <a:endParaRPr lang="ko-KR" altLang="en-US" sz="3600" spc="-300" dirty="0">
+              <a:solidFill>
+                <a:schemeClr val="bg1"/>
+              </a:solidFill>
+            </a:endParaRPr>
           </a:p>
         </p:txBody>
       </p:sp>
@@ -11313,7 +12356,7 @@
         <p:spPr>
           <a:xfrm>
             <a:off x="339536" y="1264666"/>
-            <a:ext cx="3768980" cy="461665"/>
+            <a:ext cx="5344733" cy="461665"/>
           </a:xfrm>
           <a:prstGeom prst="rect">
             <a:avLst/>
@@ -11333,7 +12376,61 @@
                 </a:solidFill>
                 <a:latin typeface="+mn-ea"/>
               </a:rPr>
-              <a:t>앙상블 모델 훈련 및 성능 평가</a:t>
+              <a:t>데이터 </a:t>
+            </a:r>
+            <a:r>
+              <a:rPr lang="ko-KR" altLang="en-US" sz="2400" spc="-300" dirty="0" err="1">
+                <a:solidFill>
+                  <a:srgbClr val="393939"/>
+                </a:solidFill>
+                <a:latin typeface="+mn-ea"/>
+              </a:rPr>
+              <a:t>전처리</a:t>
+            </a:r>
+            <a:r>
+              <a:rPr lang="ko-KR" altLang="en-US" sz="2400" spc="-300" dirty="0">
+                <a:solidFill>
+                  <a:srgbClr val="393939"/>
+                </a:solidFill>
+                <a:latin typeface="+mn-ea"/>
+              </a:rPr>
+              <a:t> </a:t>
+            </a:r>
+            <a:r>
+              <a:rPr lang="en-US" altLang="ko-KR" sz="2400" spc="-300" dirty="0">
+                <a:solidFill>
+                  <a:srgbClr val="393939"/>
+                </a:solidFill>
+                <a:latin typeface="+mn-ea"/>
+              </a:rPr>
+              <a:t>- </a:t>
+            </a:r>
+            <a:r>
+              <a:rPr lang="ko-KR" altLang="en-US" sz="2400" spc="-300" dirty="0">
+                <a:solidFill>
+                  <a:srgbClr val="393939"/>
+                </a:solidFill>
+                <a:latin typeface="+mn-ea"/>
+              </a:rPr>
+              <a:t>범주형 데이터 </a:t>
+            </a:r>
+            <a:r>
+              <a:rPr lang="ko-KR" altLang="en-US" sz="2400" spc="-300" dirty="0" err="1">
+                <a:solidFill>
+                  <a:srgbClr val="393939"/>
+                </a:solidFill>
+                <a:latin typeface="+mn-ea"/>
+              </a:rPr>
+              <a:t>재분류</a:t>
+            </a:r>
+            <a:r>
+              <a:rPr lang="ko-KR" altLang="en-US" sz="2400" spc="-300" dirty="0">
+                <a:solidFill>
+                  <a:srgbClr val="393939"/>
+                </a:solidFill>
+                <a:latin typeface="+mn-ea"/>
+              </a:rPr>
+              <a:t> 과정 </a:t>
             </a:r>
           </a:p>
         </p:txBody>
@@ -11392,10 +12489,10 @@
       </p:sp>
       <p:sp>
         <p:nvSpPr>
-          <p:cNvPr id="15" name="TextBox 14">
+          <p:cNvPr id="5" name="TextBox 4">
             <a:extLst>
               <a:ext uri="{FF2B5EF4-FFF2-40B4-BE49-F238E27FC236}">
-                <a16:creationId xmlns:a16="http://schemas.microsoft.com/office/drawing/2014/main" id="{FDEBF861-EDAF-1BA2-9E15-553808EECCB7}"/>
+                <a16:creationId xmlns:a16="http://schemas.microsoft.com/office/drawing/2014/main" id="{64A98D59-23F6-4A33-1CC0-DBE24AC7CE25}"/>
               </a:ext>
             </a:extLst>
           </p:cNvPr>
@@ -11404,8 +12501,8 @@
         </p:nvSpPr>
         <p:spPr>
           <a:xfrm>
-            <a:off x="132080" y="1913974"/>
-            <a:ext cx="10401567" cy="1815882"/>
+            <a:off x="240080" y="1913974"/>
+            <a:ext cx="5552189" cy="1169551"/>
           </a:xfrm>
           <a:prstGeom prst="rect">
             <a:avLst/>
@@ -11427,35 +12524,35 @@
                 <a:latin typeface="+mj-ea"/>
                 <a:ea typeface="+mj-ea"/>
               </a:rPr>
-              <a:t>목적 </a:t>
+              <a:t>개수가 매우 적어 분석에 유의미한 영향을 주지 않는 범주형 변수는 </a:t>
             </a:r>
             <a:r>
               <a:rPr lang="en-US" altLang="ko-KR" sz="1400" dirty="0">
                 <a:latin typeface="+mj-ea"/>
                 <a:ea typeface="+mj-ea"/>
               </a:rPr>
-              <a:t>: </a:t>
+              <a:t>‘</a:t>
             </a:r>
             <a:r>
               <a:rPr lang="ko-KR" altLang="en-US" sz="1400" dirty="0">
                 <a:latin typeface="+mj-ea"/>
                 <a:ea typeface="+mj-ea"/>
               </a:rPr>
-              <a:t>단일 모델로서 일정 이상의 성능을 나타내는 모델들을 </a:t>
-            </a:r>
-            <a:r>
-              <a:rPr lang="ko-KR" altLang="en-US" sz="1400" dirty="0" err="1">
+              <a:t>기타</a:t>
+            </a:r>
+            <a:r>
+              <a:rPr lang="en-US" altLang="ko-KR" sz="1400" dirty="0">
                 <a:latin typeface="+mj-ea"/>
                 <a:ea typeface="+mj-ea"/>
               </a:rPr>
-              <a:t>앙상블하여</a:t>
+              <a:t>‘ </a:t>
             </a:r>
             <a:r>
               <a:rPr lang="ko-KR" altLang="en-US" sz="1400" dirty="0">
                 <a:latin typeface="+mj-ea"/>
                 <a:ea typeface="+mj-ea"/>
               </a:rPr>
-              <a:t> 추가적인 성능 향상이 가능한지의 여부를 확인</a:t>
+              <a:t>구분으로 통합하여 데이터 불균형 해소</a:t>
             </a:r>
             <a:endParaRPr lang="en-US" altLang="ko-KR" sz="1400" dirty="0">
               <a:latin typeface="+mj-ea"/>
@@ -11482,312 +12579,253 @@
                 <a:latin typeface="+mj-ea"/>
                 <a:ea typeface="+mj-ea"/>
               </a:rPr>
-              <a:t>각 모델의 성능을 확인한 결과 </a:t>
-            </a:r>
-            <a:r>
-              <a:rPr lang="en-US" altLang="ko-KR" sz="1400" dirty="0" err="1">
-                <a:latin typeface="+mj-ea"/>
-                <a:ea typeface="+mj-ea"/>
-              </a:rPr>
-              <a:t>XGBoost</a:t>
+              <a:t>단일 컬럼 내에서 </a:t>
             </a:r>
             <a:r>
               <a:rPr lang="en-US" altLang="ko-KR" sz="1400" dirty="0">
                 <a:latin typeface="+mj-ea"/>
                 <a:ea typeface="+mj-ea"/>
               </a:rPr>
-              <a:t>, </a:t>
-            </a:r>
-            <a:r>
-              <a:rPr lang="en-US" altLang="ko-KR" sz="1400" dirty="0" err="1">
+              <a:t>‘</a:t>
+            </a:r>
+            <a:r>
+              <a:rPr lang="ko-KR" altLang="en-US" sz="1400" dirty="0">
                 <a:latin typeface="+mj-ea"/>
                 <a:ea typeface="+mj-ea"/>
               </a:rPr>
-              <a:t>LightGBM</a:t>
+              <a:t>기타</a:t>
             </a:r>
             <a:r>
               <a:rPr lang="en-US" altLang="ko-KR" sz="1400" dirty="0">
                 <a:latin typeface="+mj-ea"/>
                 <a:ea typeface="+mj-ea"/>
               </a:rPr>
-              <a:t>, </a:t>
-            </a:r>
-            <a:r>
-              <a:rPr lang="en-US" altLang="ko-KR" sz="1400" dirty="0" err="1">
-                <a:latin typeface="+mj-ea"/>
-                <a:ea typeface="+mj-ea"/>
-              </a:rPr>
-              <a:t>CatBoost</a:t>
+              <a:t>‘ </a:t>
             </a:r>
             <a:r>
               <a:rPr lang="ko-KR" altLang="en-US" sz="1400" dirty="0">
                 <a:latin typeface="+mj-ea"/>
                 <a:ea typeface="+mj-ea"/>
               </a:rPr>
-              <a:t> </a:t>
-            </a:r>
-            <a:r>
-              <a:rPr lang="en-US" altLang="ko-KR" sz="1400" dirty="0">
-                <a:latin typeface="+mj-ea"/>
-                <a:ea typeface="+mj-ea"/>
-              </a:rPr>
-              <a:t>3</a:t>
-            </a:r>
-            <a:r>
-              <a:rPr lang="ko-KR" altLang="en-US" sz="1400" dirty="0">
-                <a:latin typeface="+mj-ea"/>
-                <a:ea typeface="+mj-ea"/>
-              </a:rPr>
-              <a:t>종의 모델을 사용하기로 결정</a:t>
+              <a:t>로 분류할 개수의 기준은 해당 컬럼 내 데이터의 균형 상태를 확인하여 유동적으로 결정</a:t>
             </a:r>
             <a:endParaRPr lang="en-US" altLang="ko-KR" sz="1400" dirty="0">
               <a:latin typeface="+mj-ea"/>
               <a:ea typeface="+mj-ea"/>
             </a:endParaRPr>
           </a:p>
-          <a:p>
-            <a:pPr marL="228600" indent="-228600">
-              <a:buFont typeface="+mj-lt"/>
-              <a:buAutoNum type="arabicPeriod"/>
-            </a:pPr>
-            <a:endParaRPr lang="en-US" altLang="ko-KR" sz="1400" dirty="0">
-              <a:latin typeface="+mj-ea"/>
-              <a:ea typeface="+mj-ea"/>
-            </a:endParaRPr>
-          </a:p>
-          <a:p>
-            <a:pPr marL="228600" indent="-228600">
-              <a:buFont typeface="+mj-lt"/>
-              <a:buAutoNum type="arabicPeriod"/>
-            </a:pPr>
-            <a:r>
-              <a:rPr lang="ko-KR" altLang="en-US" sz="1400" dirty="0">
-                <a:latin typeface="+mj-ea"/>
-                <a:ea typeface="+mj-ea"/>
-              </a:rPr>
-              <a:t>다수의 다른 종류의 모델을 </a:t>
-            </a:r>
-            <a:r>
-              <a:rPr lang="ko-KR" altLang="en-US" sz="1400" dirty="0" err="1">
-                <a:latin typeface="+mj-ea"/>
-                <a:ea typeface="+mj-ea"/>
-              </a:rPr>
-              <a:t>앙상블하는</a:t>
-            </a:r>
-            <a:r>
-              <a:rPr lang="ko-KR" altLang="en-US" sz="1400" dirty="0">
-                <a:latin typeface="+mj-ea"/>
-                <a:ea typeface="+mj-ea"/>
-              </a:rPr>
-              <a:t> 방법에는 </a:t>
-            </a:r>
-            <a:r>
-              <a:rPr lang="en-US" altLang="ko-KR" sz="1400" dirty="0">
-                <a:latin typeface="+mj-ea"/>
-                <a:ea typeface="+mj-ea"/>
-              </a:rPr>
-              <a:t>Voting</a:t>
-            </a:r>
-            <a:r>
-              <a:rPr lang="ko-KR" altLang="en-US" sz="1400" dirty="0">
-                <a:latin typeface="+mj-ea"/>
-                <a:ea typeface="+mj-ea"/>
-              </a:rPr>
-              <a:t>과 </a:t>
-            </a:r>
-            <a:r>
-              <a:rPr lang="en-US" altLang="ko-KR" sz="1400" dirty="0">
-                <a:latin typeface="+mj-ea"/>
-                <a:ea typeface="+mj-ea"/>
-              </a:rPr>
-              <a:t>Stacking</a:t>
-            </a:r>
-            <a:r>
-              <a:rPr lang="ko-KR" altLang="en-US" sz="1400" dirty="0">
-                <a:latin typeface="+mj-ea"/>
-                <a:ea typeface="+mj-ea"/>
-              </a:rPr>
-              <a:t>을 선정</a:t>
-            </a:r>
-            <a:endParaRPr lang="en-US" altLang="ko-KR" sz="1400" dirty="0">
-              <a:latin typeface="+mj-ea"/>
-              <a:ea typeface="+mj-ea"/>
-            </a:endParaRPr>
-          </a:p>
-          <a:p>
-            <a:pPr marL="742950" lvl="1" indent="-285750">
-              <a:buFont typeface="Arial" panose="020B0604020202020204" pitchFamily="34" charset="0"/>
-              <a:buChar char="•"/>
-            </a:pPr>
-            <a:r>
-              <a:rPr lang="en-US" altLang="ko-KR" sz="1400" dirty="0">
-                <a:latin typeface="+mj-ea"/>
-                <a:ea typeface="+mj-ea"/>
-              </a:rPr>
-              <a:t>Stacking</a:t>
-            </a:r>
-            <a:r>
-              <a:rPr lang="ko-KR" altLang="en-US" sz="1400" dirty="0">
-                <a:latin typeface="+mj-ea"/>
-                <a:ea typeface="+mj-ea"/>
-              </a:rPr>
-              <a:t>의 </a:t>
-            </a:r>
-            <a:r>
-              <a:rPr lang="en-US" altLang="ko-KR" sz="1400" dirty="0">
-                <a:latin typeface="+mj-ea"/>
-                <a:ea typeface="+mj-ea"/>
-              </a:rPr>
-              <a:t>Final estimator</a:t>
-            </a:r>
-            <a:r>
-              <a:rPr lang="ko-KR" altLang="en-US" sz="1400" dirty="0">
-                <a:latin typeface="+mj-ea"/>
-                <a:ea typeface="+mj-ea"/>
-              </a:rPr>
-              <a:t>는 </a:t>
-            </a:r>
-            <a:r>
-              <a:rPr lang="en-US" altLang="ko-KR" sz="1400" dirty="0" err="1">
-                <a:latin typeface="+mj-ea"/>
-                <a:ea typeface="+mj-ea"/>
-              </a:rPr>
-              <a:t>XGBoost</a:t>
-            </a:r>
-            <a:r>
-              <a:rPr lang="ko-KR" altLang="en-US" sz="1400" dirty="0">
-                <a:latin typeface="+mj-ea"/>
-                <a:ea typeface="+mj-ea"/>
-              </a:rPr>
-              <a:t>를 사용</a:t>
-            </a:r>
-            <a:endParaRPr lang="en-US" altLang="ko-KR" sz="1400" dirty="0">
-              <a:latin typeface="+mj-ea"/>
-              <a:ea typeface="+mj-ea"/>
-            </a:endParaRPr>
-          </a:p>
-          <a:p>
-            <a:pPr marL="228600" indent="-228600">
-              <a:buFont typeface="+mj-lt"/>
-              <a:buAutoNum type="arabicPeriod"/>
-            </a:pPr>
-            <a:endParaRPr lang="en-US" altLang="ko-KR" sz="1400" dirty="0">
-              <a:latin typeface="+mj-ea"/>
-              <a:ea typeface="+mj-ea"/>
-            </a:endParaRPr>
-          </a:p>
-          <a:p>
-            <a:pPr marL="228600" indent="-228600">
-              <a:buFont typeface="+mj-lt"/>
-              <a:buAutoNum type="arabicPeriod"/>
-            </a:pPr>
-            <a:r>
-              <a:rPr lang="ko-KR" altLang="en-US" sz="1400" dirty="0">
-                <a:latin typeface="+mj-ea"/>
-                <a:ea typeface="+mj-ea"/>
-              </a:rPr>
-              <a:t>앙상블 결과 </a:t>
-            </a:r>
-            <a:r>
-              <a:rPr lang="en-US" altLang="ko-KR" sz="1400" dirty="0">
-                <a:latin typeface="+mj-ea"/>
-                <a:ea typeface="+mj-ea"/>
-              </a:rPr>
-              <a:t>(Soft) Voting</a:t>
-            </a:r>
-            <a:r>
-              <a:rPr lang="ko-KR" altLang="en-US" sz="1400" dirty="0">
-                <a:latin typeface="+mj-ea"/>
-                <a:ea typeface="+mj-ea"/>
-              </a:rPr>
-              <a:t>에서 </a:t>
-            </a:r>
-            <a:r>
-              <a:rPr lang="en-US" altLang="ko-KR" sz="1400" dirty="0">
-                <a:latin typeface="+mj-ea"/>
-                <a:ea typeface="+mj-ea"/>
-              </a:rPr>
-              <a:t>ACC 0.514, Stacking</a:t>
-            </a:r>
-            <a:r>
-              <a:rPr lang="ko-KR" altLang="en-US" sz="1400" dirty="0">
-                <a:latin typeface="+mj-ea"/>
-                <a:ea typeface="+mj-ea"/>
-              </a:rPr>
-              <a:t>에서는 </a:t>
-            </a:r>
-            <a:r>
-              <a:rPr lang="en-US" altLang="ko-KR" sz="1400" dirty="0">
-                <a:latin typeface="+mj-ea"/>
-                <a:ea typeface="+mj-ea"/>
-              </a:rPr>
-              <a:t>ACC 0.487</a:t>
-            </a:r>
-            <a:r>
-              <a:rPr lang="ko-KR" altLang="en-US" sz="1400" dirty="0">
-                <a:latin typeface="+mj-ea"/>
-                <a:ea typeface="+mj-ea"/>
-              </a:rPr>
-              <a:t>의 결과를 확인함</a:t>
-            </a:r>
-            <a:endParaRPr lang="en-US" altLang="ko-KR" sz="1400" dirty="0">
-              <a:latin typeface="+mj-ea"/>
-              <a:ea typeface="+mj-ea"/>
-            </a:endParaRPr>
-          </a:p>
         </p:txBody>
       </p:sp>
+      <p:pic>
+        <p:nvPicPr>
+          <p:cNvPr id="10" name="그림 9">
+            <a:extLst>
+              <a:ext uri="{FF2B5EF4-FFF2-40B4-BE49-F238E27FC236}">
+                <a16:creationId xmlns:a16="http://schemas.microsoft.com/office/drawing/2014/main" id="{7BD57D6B-6792-446F-3715-692A461C7220}"/>
+              </a:ext>
+            </a:extLst>
+          </p:cNvPr>
+          <p:cNvPicPr>
+            <a:picLocks noChangeAspect="1"/>
+          </p:cNvPicPr>
+          <p:nvPr/>
+        </p:nvPicPr>
+        <p:blipFill>
+          <a:blip r:embed="rId2"/>
+          <a:stretch>
+            <a:fillRect/>
+          </a:stretch>
+        </p:blipFill>
+        <p:spPr>
+          <a:xfrm>
+            <a:off x="3543928" y="3268030"/>
+            <a:ext cx="2140341" cy="2611355"/>
+          </a:xfrm>
+          <a:prstGeom prst="rect">
+            <a:avLst/>
+          </a:prstGeom>
+        </p:spPr>
+      </p:pic>
+      <p:pic>
+        <p:nvPicPr>
+          <p:cNvPr id="14" name="그림 13">
+            <a:extLst>
+              <a:ext uri="{FF2B5EF4-FFF2-40B4-BE49-F238E27FC236}">
+                <a16:creationId xmlns:a16="http://schemas.microsoft.com/office/drawing/2014/main" id="{D046F4F6-72AF-AAAA-6DEF-210D11F8F918}"/>
+              </a:ext>
+            </a:extLst>
+          </p:cNvPr>
+          <p:cNvPicPr>
+            <a:picLocks noChangeAspect="1"/>
+          </p:cNvPicPr>
+          <p:nvPr/>
+        </p:nvPicPr>
+        <p:blipFill>
+          <a:blip r:embed="rId3"/>
+          <a:stretch>
+            <a:fillRect/>
+          </a:stretch>
+        </p:blipFill>
+        <p:spPr>
+          <a:xfrm>
+            <a:off x="627224" y="3268032"/>
+            <a:ext cx="1784541" cy="2611356"/>
+          </a:xfrm>
+          <a:prstGeom prst="rect">
+            <a:avLst/>
+          </a:prstGeom>
+        </p:spPr>
+      </p:pic>
       <p:sp>
         <p:nvSpPr>
-          <p:cNvPr id="4" name="TextBox 3">
+          <p:cNvPr id="16" name="직사각형 15">
             <a:extLst>
               <a:ext uri="{FF2B5EF4-FFF2-40B4-BE49-F238E27FC236}">
-                <a16:creationId xmlns:a16="http://schemas.microsoft.com/office/drawing/2014/main" id="{1083CAF8-6E8D-E5B7-4634-AD23AEA2E7B9}"/>
+                <a16:creationId xmlns:a16="http://schemas.microsoft.com/office/drawing/2014/main" id="{67AD3AEE-CD7E-0561-2558-99EEEA2853C1}"/>
               </a:ext>
             </a:extLst>
           </p:cNvPr>
-          <p:cNvSpPr txBox="1"/>
+          <p:cNvSpPr/>
           <p:nvPr/>
         </p:nvSpPr>
         <p:spPr>
           <a:xfrm>
-            <a:off x="1792705" y="3729856"/>
-            <a:ext cx="2179186" cy="369332"/>
+            <a:off x="697832" y="4680284"/>
+            <a:ext cx="1636294" cy="246648"/>
           </a:xfrm>
           <a:prstGeom prst="rect">
             <a:avLst/>
           </a:prstGeom>
           <a:noFill/>
+          <a:ln w="28575">
+            <a:solidFill>
+              <a:srgbClr val="FFC000"/>
+            </a:solidFill>
+          </a:ln>
         </p:spPr>
+        <p:style>
+          <a:lnRef idx="2">
+            <a:schemeClr val="accent1">
+              <a:shade val="15000"/>
+            </a:schemeClr>
+          </a:lnRef>
+          <a:fillRef idx="1">
+            <a:schemeClr val="accent1"/>
+          </a:fillRef>
+          <a:effectRef idx="0">
+            <a:schemeClr val="accent1"/>
+          </a:effectRef>
+          <a:fontRef idx="minor">
+            <a:schemeClr val="lt1"/>
+          </a:fontRef>
+        </p:style>
         <p:txBody>
-          <a:bodyPr wrap="none" rtlCol="0">
-            <a:spAutoFit/>
-          </a:bodyPr>
+          <a:bodyPr rtlCol="0" anchor="ctr"/>
           <a:lstStyle/>
           <a:p>
-            <a:r>
-              <a:rPr lang="en-US" altLang="ko-KR" dirty="0">
-                <a:solidFill>
-                  <a:srgbClr val="FF0000"/>
-                </a:solidFill>
-              </a:rPr>
-              <a:t>Voting </a:t>
-            </a:r>
-            <a:r>
-              <a:rPr lang="ko-KR" altLang="en-US" dirty="0">
-                <a:solidFill>
-                  <a:srgbClr val="FF0000"/>
-                </a:solidFill>
-              </a:rPr>
-              <a:t>모델 도식화</a:t>
-            </a:r>
+            <a:pPr algn="ctr"/>
+            <a:endParaRPr lang="ko-KR" altLang="en-US"/>
           </a:p>
         </p:txBody>
       </p:sp>
+      <p:sp>
+        <p:nvSpPr>
+          <p:cNvPr id="17" name="직사각형 16">
+            <a:extLst>
+              <a:ext uri="{FF2B5EF4-FFF2-40B4-BE49-F238E27FC236}">
+                <a16:creationId xmlns:a16="http://schemas.microsoft.com/office/drawing/2014/main" id="{BE91D24C-5E17-4731-436E-374AE80CE6C1}"/>
+              </a:ext>
+            </a:extLst>
+          </p:cNvPr>
+          <p:cNvSpPr/>
+          <p:nvPr/>
+        </p:nvSpPr>
+        <p:spPr>
+          <a:xfrm>
+            <a:off x="3543928" y="3545305"/>
+            <a:ext cx="2140341" cy="2334080"/>
+          </a:xfrm>
+          <a:prstGeom prst="rect">
+            <a:avLst/>
+          </a:prstGeom>
+          <a:noFill/>
+          <a:ln w="28575">
+            <a:solidFill>
+              <a:srgbClr val="FFC000"/>
+            </a:solidFill>
+          </a:ln>
+        </p:spPr>
+        <p:style>
+          <a:lnRef idx="2">
+            <a:schemeClr val="accent1">
+              <a:shade val="15000"/>
+            </a:schemeClr>
+          </a:lnRef>
+          <a:fillRef idx="1">
+            <a:schemeClr val="accent1"/>
+          </a:fillRef>
+          <a:effectRef idx="0">
+            <a:schemeClr val="accent1"/>
+          </a:effectRef>
+          <a:fontRef idx="minor">
+            <a:schemeClr val="lt1"/>
+          </a:fontRef>
+        </p:style>
+        <p:txBody>
+          <a:bodyPr rtlCol="0" anchor="ctr"/>
+          <a:lstStyle/>
+          <a:p>
+            <a:pPr algn="ctr"/>
+            <a:endParaRPr lang="ko-KR" altLang="en-US"/>
+          </a:p>
+        </p:txBody>
+      </p:sp>
+      <p:cxnSp>
+        <p:nvCxnSpPr>
+          <p:cNvPr id="19" name="직선 화살표 연결선 18">
+            <a:extLst>
+              <a:ext uri="{FF2B5EF4-FFF2-40B4-BE49-F238E27FC236}">
+                <a16:creationId xmlns:a16="http://schemas.microsoft.com/office/drawing/2014/main" id="{1F9B8460-B4AB-A8F3-7AA0-4A1034A70B9F}"/>
+              </a:ext>
+            </a:extLst>
+          </p:cNvPr>
+          <p:cNvCxnSpPr/>
+          <p:nvPr/>
+        </p:nvCxnSpPr>
+        <p:spPr>
+          <a:xfrm flipH="1">
+            <a:off x="2616868" y="4818647"/>
+            <a:ext cx="655721" cy="0"/>
+          </a:xfrm>
+          <a:prstGeom prst="straightConnector1">
+            <a:avLst/>
+          </a:prstGeom>
+          <a:ln w="38100">
+            <a:solidFill>
+              <a:srgbClr val="00B0F0"/>
+            </a:solidFill>
+            <a:tailEnd type="triangle"/>
+          </a:ln>
+        </p:spPr>
+        <p:style>
+          <a:lnRef idx="1">
+            <a:schemeClr val="accent1"/>
+          </a:lnRef>
+          <a:fillRef idx="0">
+            <a:schemeClr val="accent1"/>
+          </a:fillRef>
+          <a:effectRef idx="0">
+            <a:schemeClr val="accent1"/>
+          </a:effectRef>
+          <a:fontRef idx="minor">
+            <a:schemeClr val="tx1"/>
+          </a:fontRef>
+        </p:style>
+      </p:cxnSp>
     </p:spTree>
     <p:extLst>
       <p:ext uri="{BB962C8B-B14F-4D97-AF65-F5344CB8AC3E}">
-        <p14:creationId xmlns:p14="http://schemas.microsoft.com/office/powerpoint/2010/main" val="2609321503"/>
+        <p14:creationId xmlns:p14="http://schemas.microsoft.com/office/powerpoint/2010/main" val="2016418326"/>
       </p:ext>
     </p:extLst>
   </p:cSld>
@@ -11928,7 +12966,7 @@
                   <a:schemeClr val="bg1"/>
                 </a:solidFill>
               </a:rPr>
-              <a:t>딥러닝</a:t>
+              <a:t>앙상블</a:t>
             </a:r>
           </a:p>
         </p:txBody>
@@ -11968,7 +13006,7 @@
                 </a:solidFill>
                 <a:latin typeface="+mn-ea"/>
               </a:rPr>
-              <a:t>딥러닝 모델 구현 및 성능 평가</a:t>
+              <a:t>앙상블 모델 훈련 및 성능 평가</a:t>
             </a:r>
           </a:p>
         </p:txBody>
@@ -12040,7 +13078,7 @@
         <p:spPr>
           <a:xfrm>
             <a:off x="132080" y="1913974"/>
-            <a:ext cx="10539931" cy="3539430"/>
+            <a:ext cx="10401567" cy="1815882"/>
           </a:xfrm>
           <a:prstGeom prst="rect">
             <a:avLst/>
@@ -12062,135 +13100,35 @@
                 <a:latin typeface="+mj-ea"/>
                 <a:ea typeface="+mj-ea"/>
               </a:rPr>
-              <a:t>딥러닝 모델을 구현하기 위한 분석 목표 확인</a:t>
-            </a:r>
-            <a:endParaRPr lang="en-US" altLang="ko-KR" sz="1400" dirty="0">
-              <a:latin typeface="+mj-ea"/>
-              <a:ea typeface="+mj-ea"/>
-            </a:endParaRPr>
-          </a:p>
-          <a:p>
-            <a:pPr marL="742950" lvl="1" indent="-285750">
-              <a:buFont typeface="Arial" panose="020B0604020202020204" pitchFamily="34" charset="0"/>
-              <a:buChar char="•"/>
-            </a:pPr>
+              <a:t>목적 </a:t>
+            </a:r>
+            <a:r>
+              <a:rPr lang="en-US" altLang="ko-KR" sz="1400" dirty="0">
+                <a:latin typeface="+mj-ea"/>
+                <a:ea typeface="+mj-ea"/>
+              </a:rPr>
+              <a:t>: </a:t>
+            </a:r>
             <a:r>
               <a:rPr lang="ko-KR" altLang="en-US" sz="1400" dirty="0">
                 <a:latin typeface="+mj-ea"/>
                 <a:ea typeface="+mj-ea"/>
               </a:rPr>
-              <a:t>여러 </a:t>
-            </a:r>
-            <a:r>
-              <a:rPr lang="en-US" altLang="ko-KR" sz="1400" dirty="0">
+              <a:t>단일 모델로서 일정 이상의 성능을 나타내는 모델들을 </a:t>
+            </a:r>
+            <a:r>
+              <a:rPr lang="ko-KR" altLang="en-US" sz="1400" dirty="0" err="1">
                 <a:latin typeface="+mj-ea"/>
                 <a:ea typeface="+mj-ea"/>
               </a:rPr>
-              <a:t>1</a:t>
+              <a:t>앙상블하여</a:t>
             </a:r>
             <a:r>
               <a:rPr lang="ko-KR" altLang="en-US" sz="1400" dirty="0">
                 <a:latin typeface="+mj-ea"/>
                 <a:ea typeface="+mj-ea"/>
               </a:rPr>
-              <a:t>차원 컬럼으로 구성된 다중 분류 문제</a:t>
-            </a:r>
-            <a:endParaRPr lang="en-US" altLang="ko-KR" sz="1400" dirty="0">
-              <a:latin typeface="+mj-ea"/>
-              <a:ea typeface="+mj-ea"/>
-            </a:endParaRPr>
-          </a:p>
-          <a:p>
-            <a:pPr marL="742950" lvl="1" indent="-285750">
-              <a:buFont typeface="Arial" panose="020B0604020202020204" pitchFamily="34" charset="0"/>
-              <a:buChar char="•"/>
-            </a:pPr>
-            <a:r>
-              <a:rPr lang="ko-KR" altLang="en-US" sz="1400" dirty="0">
-                <a:latin typeface="+mj-ea"/>
-                <a:ea typeface="+mj-ea"/>
-              </a:rPr>
-              <a:t>은닉층의 구성은 </a:t>
-            </a:r>
-            <a:r>
-              <a:rPr lang="en-US" altLang="ko-KR" sz="1400" dirty="0">
-                <a:latin typeface="+mj-ea"/>
-                <a:ea typeface="+mj-ea"/>
-              </a:rPr>
-              <a:t>Dense </a:t>
-            </a:r>
-            <a:r>
-              <a:rPr lang="ko-KR" altLang="en-US" sz="1400" dirty="0">
-                <a:latin typeface="+mj-ea"/>
-                <a:ea typeface="+mj-ea"/>
-              </a:rPr>
-              <a:t>층과 </a:t>
-            </a:r>
-            <a:r>
-              <a:rPr lang="en-US" altLang="ko-KR" sz="1400" dirty="0">
-                <a:latin typeface="+mj-ea"/>
-                <a:ea typeface="+mj-ea"/>
-              </a:rPr>
-              <a:t>Dropout </a:t>
-            </a:r>
-            <a:r>
-              <a:rPr lang="ko-KR" altLang="en-US" sz="1400" dirty="0">
-                <a:latin typeface="+mj-ea"/>
-                <a:ea typeface="+mj-ea"/>
-              </a:rPr>
-              <a:t>층을 사용</a:t>
-            </a:r>
-            <a:endParaRPr lang="en-US" altLang="ko-KR" sz="1400" dirty="0">
-              <a:latin typeface="+mj-ea"/>
-              <a:ea typeface="+mj-ea"/>
-            </a:endParaRPr>
-          </a:p>
-          <a:p>
-            <a:pPr marL="742950" lvl="1" indent="-285750">
-              <a:buFont typeface="Arial" panose="020B0604020202020204" pitchFamily="34" charset="0"/>
-              <a:buChar char="•"/>
-            </a:pPr>
-            <a:r>
-              <a:rPr lang="ko-KR" altLang="en-US" sz="1400" dirty="0">
-                <a:latin typeface="+mj-ea"/>
-                <a:ea typeface="+mj-ea"/>
-              </a:rPr>
-              <a:t>출력층은 </a:t>
-            </a:r>
-            <a:r>
-              <a:rPr lang="en-US" altLang="ko-KR" sz="1400" dirty="0" err="1">
-                <a:latin typeface="+mj-ea"/>
-                <a:ea typeface="+mj-ea"/>
-              </a:rPr>
-              <a:t>softmax</a:t>
-            </a:r>
-            <a:r>
-              <a:rPr lang="en-US" altLang="ko-KR" sz="1400" dirty="0">
-                <a:latin typeface="+mj-ea"/>
-                <a:ea typeface="+mj-ea"/>
-              </a:rPr>
-              <a:t> </a:t>
-            </a:r>
-            <a:r>
-              <a:rPr lang="ko-KR" altLang="en-US" sz="1400" dirty="0">
-                <a:latin typeface="+mj-ea"/>
-                <a:ea typeface="+mj-ea"/>
-              </a:rPr>
-              <a:t>활성화 함수를 적용한 단일 </a:t>
-            </a:r>
-            <a:r>
-              <a:rPr lang="en-US" altLang="ko-KR" sz="1400" dirty="0">
-                <a:latin typeface="+mj-ea"/>
-                <a:ea typeface="+mj-ea"/>
-              </a:rPr>
-              <a:t>Dense </a:t>
-            </a:r>
-            <a:r>
-              <a:rPr lang="ko-KR" altLang="en-US" sz="1400" dirty="0">
-                <a:latin typeface="+mj-ea"/>
-                <a:ea typeface="+mj-ea"/>
-              </a:rPr>
-              <a:t>층으로 구성</a:t>
+              <a:t> 추가적인 성능 향상이 가능한지의 여부를 확인</a:t>
             </a:r>
             <a:endParaRPr lang="en-US" altLang="ko-KR" sz="1400" dirty="0">
               <a:latin typeface="+mj-ea"/>
@@ -12217,21 +13155,63 @@
                 <a:latin typeface="+mj-ea"/>
                 <a:ea typeface="+mj-ea"/>
               </a:rPr>
-              <a:t>딥러닝 모델 훈련을 위한 모델 구성 및 </a:t>
-            </a:r>
-            <a:r>
-              <a:rPr lang="ko-KR" altLang="en-US" sz="1400" dirty="0" err="1">
+              <a:t>각 모델의 성능을 확인한 결과 </a:t>
+            </a:r>
+            <a:r>
+              <a:rPr lang="en-US" altLang="ko-KR" sz="1400" dirty="0" err="1">
                 <a:latin typeface="+mj-ea"/>
                 <a:ea typeface="+mj-ea"/>
               </a:rPr>
-              <a:t>하이퍼파라미터</a:t>
+              <a:t>XGBoost</a:t>
+            </a:r>
+            <a:r>
+              <a:rPr lang="en-US" altLang="ko-KR" sz="1400" dirty="0">
+                <a:latin typeface="+mj-ea"/>
+                <a:ea typeface="+mj-ea"/>
+              </a:rPr>
+              <a:t>, </a:t>
+            </a:r>
+            <a:r>
+              <a:rPr lang="en-US" altLang="ko-KR" sz="1400" dirty="0" err="1">
+                <a:latin typeface="+mj-ea"/>
+                <a:ea typeface="+mj-ea"/>
+              </a:rPr>
+              <a:t>LightGBM</a:t>
+            </a:r>
+            <a:r>
+              <a:rPr lang="en-US" altLang="ko-KR" sz="1400" dirty="0">
+                <a:latin typeface="+mj-ea"/>
+                <a:ea typeface="+mj-ea"/>
+              </a:rPr>
+              <a:t>, </a:t>
+            </a:r>
+            <a:r>
+              <a:rPr lang="en-US" altLang="ko-KR" sz="1400" dirty="0" err="1">
+                <a:latin typeface="+mj-ea"/>
+                <a:ea typeface="+mj-ea"/>
+              </a:rPr>
+              <a:t>CatBoost</a:t>
             </a:r>
             <a:r>
               <a:rPr lang="ko-KR" altLang="en-US" sz="1400" dirty="0">
                 <a:latin typeface="+mj-ea"/>
                 <a:ea typeface="+mj-ea"/>
               </a:rPr>
-              <a:t> 선정</a:t>
+              <a:t> </a:t>
+            </a:r>
+            <a:r>
+              <a:rPr lang="en-US" altLang="ko-KR" sz="1400" dirty="0">
+                <a:latin typeface="+mj-ea"/>
+                <a:ea typeface="+mj-ea"/>
+              </a:rPr>
+              <a:t>3</a:t>
+            </a:r>
+            <a:r>
+              <a:rPr lang="ko-KR" altLang="en-US" sz="1400" dirty="0">
+                <a:latin typeface="+mj-ea"/>
+                <a:ea typeface="+mj-ea"/>
+              </a:rPr>
+              <a:t>종의 모델을 사용하기로 결정</a:t>
             </a:r>
             <a:endParaRPr lang="en-US" altLang="ko-KR" sz="1400" dirty="0">
               <a:latin typeface="+mj-ea"/>
@@ -12239,97 +13219,7 @@
             </a:endParaRPr>
           </a:p>
           <a:p>
-            <a:pPr marL="685800" lvl="1" indent="-228600">
-              <a:buFont typeface="+mj-lt"/>
-              <a:buAutoNum type="arabicPeriod"/>
-            </a:pPr>
-            <a:r>
-              <a:rPr lang="ko-KR" altLang="en-US" sz="1400" dirty="0">
-                <a:latin typeface="+mj-ea"/>
-                <a:ea typeface="+mj-ea"/>
-              </a:rPr>
-              <a:t>모델 구성은 </a:t>
-            </a:r>
-            <a:r>
-              <a:rPr lang="en-US" altLang="ko-KR" sz="1400" dirty="0">
-                <a:latin typeface="+mj-ea"/>
-                <a:ea typeface="+mj-ea"/>
-              </a:rPr>
-              <a:t>Dense </a:t>
-            </a:r>
-            <a:r>
-              <a:rPr lang="ko-KR" altLang="en-US" sz="1400" dirty="0">
-                <a:latin typeface="+mj-ea"/>
-                <a:ea typeface="+mj-ea"/>
-              </a:rPr>
-              <a:t>층과 </a:t>
-            </a:r>
-            <a:r>
-              <a:rPr lang="en-US" altLang="ko-KR" sz="1400" dirty="0">
-                <a:latin typeface="+mj-ea"/>
-                <a:ea typeface="+mj-ea"/>
-              </a:rPr>
-              <a:t>Dropout </a:t>
-            </a:r>
-            <a:r>
-              <a:rPr lang="ko-KR" altLang="en-US" sz="1400" dirty="0">
-                <a:latin typeface="+mj-ea"/>
-                <a:ea typeface="+mj-ea"/>
-              </a:rPr>
-              <a:t>층을 몇 단으로 쌓을 것인지 다수의 훈련 결과를 바탕으로 결정</a:t>
-            </a:r>
-            <a:endParaRPr lang="en-US" altLang="ko-KR" sz="1400" dirty="0">
-              <a:latin typeface="+mj-ea"/>
-              <a:ea typeface="+mj-ea"/>
-            </a:endParaRPr>
-          </a:p>
-          <a:p>
-            <a:pPr marL="1200150" lvl="2" indent="-285750">
-              <a:buFont typeface="Arial" panose="020B0604020202020204" pitchFamily="34" charset="0"/>
-              <a:buChar char="•"/>
-            </a:pPr>
-            <a:r>
-              <a:rPr lang="ko-KR" altLang="en-US" sz="1400" dirty="0">
-                <a:latin typeface="+mj-ea"/>
-                <a:ea typeface="+mj-ea"/>
-              </a:rPr>
-              <a:t>최종적으로 </a:t>
-            </a:r>
-            <a:r>
-              <a:rPr lang="en-US" altLang="ko-KR" sz="1400" dirty="0">
-                <a:latin typeface="+mj-ea"/>
-                <a:ea typeface="+mj-ea"/>
-              </a:rPr>
-              <a:t>Dense – Dropout – Dense – Dropout – Dense(</a:t>
-            </a:r>
-            <a:r>
-              <a:rPr lang="ko-KR" altLang="en-US" sz="1400" dirty="0" err="1">
-                <a:latin typeface="+mj-ea"/>
-                <a:ea typeface="+mj-ea"/>
-              </a:rPr>
-              <a:t>출력층</a:t>
-            </a:r>
-            <a:r>
-              <a:rPr lang="en-US" altLang="ko-KR" sz="1400" dirty="0">
-                <a:latin typeface="+mj-ea"/>
-                <a:ea typeface="+mj-ea"/>
-              </a:rPr>
-              <a:t>)</a:t>
-            </a:r>
-            <a:r>
-              <a:rPr lang="ko-KR" altLang="en-US" sz="1400" dirty="0">
-                <a:latin typeface="+mj-ea"/>
-                <a:ea typeface="+mj-ea"/>
-              </a:rPr>
-              <a:t>의 구성</a:t>
-            </a:r>
-            <a:endParaRPr lang="en-US" altLang="ko-KR" sz="1400" dirty="0">
-              <a:latin typeface="+mj-ea"/>
-              <a:ea typeface="+mj-ea"/>
-            </a:endParaRPr>
-          </a:p>
-          <a:p>
-            <a:pPr marL="685800" lvl="1" indent="-228600">
+            <a:pPr marL="228600" indent="-228600">
               <a:buFont typeface="+mj-lt"/>
               <a:buAutoNum type="arabicPeriod"/>
             </a:pPr>
@@ -12339,23 +13229,58 @@
             </a:endParaRPr>
           </a:p>
           <a:p>
-            <a:pPr marL="685800" lvl="1" indent="-228600">
+            <a:pPr marL="228600" indent="-228600">
               <a:buFont typeface="+mj-lt"/>
               <a:buAutoNum type="arabicPeriod"/>
             </a:pPr>
             <a:r>
+              <a:rPr lang="ko-KR" altLang="en-US" sz="1400" dirty="0">
+                <a:latin typeface="+mj-ea"/>
+                <a:ea typeface="+mj-ea"/>
+              </a:rPr>
+              <a:t>다수의 다른 종류의 모델을 </a:t>
+            </a:r>
+            <a:r>
               <a:rPr lang="ko-KR" altLang="en-US" sz="1400" dirty="0" err="1">
                 <a:latin typeface="+mj-ea"/>
                 <a:ea typeface="+mj-ea"/>
               </a:rPr>
-              <a:t>하이퍼파라미터</a:t>
+              <a:t>앙상블하는</a:t>
             </a:r>
             <a:r>
               <a:rPr lang="ko-KR" altLang="en-US" sz="1400" dirty="0">
                 <a:latin typeface="+mj-ea"/>
                 <a:ea typeface="+mj-ea"/>
               </a:rPr>
-              <a:t> 선정</a:t>
+              <a:t> 방법에는 </a:t>
+            </a:r>
+            <a:r>
+              <a:rPr lang="en-US" altLang="ko-KR" sz="1400" dirty="0">
+                <a:latin typeface="+mj-ea"/>
+                <a:ea typeface="+mj-ea"/>
+              </a:rPr>
+              <a:t>Voting</a:t>
+            </a:r>
+            <a:r>
+              <a:rPr lang="ko-KR" altLang="en-US" sz="1400" dirty="0">
+                <a:latin typeface="+mj-ea"/>
+                <a:ea typeface="+mj-ea"/>
+              </a:rPr>
+              <a:t>과 </a:t>
+            </a:r>
+            <a:r>
+              <a:rPr lang="en-US" altLang="ko-KR" sz="1400" dirty="0">
+                <a:latin typeface="+mj-ea"/>
+                <a:ea typeface="+mj-ea"/>
+              </a:rPr>
+              <a:t>Stacking</a:t>
+            </a:r>
+            <a:r>
+              <a:rPr lang="ko-KR" altLang="en-US" sz="1400" dirty="0">
+                <a:latin typeface="+mj-ea"/>
+                <a:ea typeface="+mj-ea"/>
+              </a:rPr>
+              <a:t>을 선정</a:t>
             </a:r>
             <a:endParaRPr lang="en-US" altLang="ko-KR" sz="1400" dirty="0">
               <a:latin typeface="+mj-ea"/>
@@ -12363,7 +13288,7 @@
             </a:endParaRPr>
           </a:p>
           <a:p>
-            <a:pPr marL="1200150" lvl="2" indent="-285750">
+            <a:pPr marL="742950" lvl="1" indent="-285750">
               <a:buFont typeface="Arial" panose="020B0604020202020204" pitchFamily="34" charset="0"/>
               <a:buChar char="•"/>
             </a:pPr>
@@ -12372,28 +13297,42 @@
                 <a:latin typeface="+mj-ea"/>
                 <a:ea typeface="+mj-ea"/>
               </a:rPr>
-              <a:t>Dense </a:t>
+              <a:t>Stacking</a:t>
             </a:r>
             <a:r>
               <a:rPr lang="ko-KR" altLang="en-US" sz="1400" dirty="0">
                 <a:latin typeface="+mj-ea"/>
                 <a:ea typeface="+mj-ea"/>
               </a:rPr>
-              <a:t>은닉층의 출력 </a:t>
+              <a:t>의 </a:t>
             </a:r>
             <a:r>
               <a:rPr lang="en-US" altLang="ko-KR" sz="1400" dirty="0">
                 <a:latin typeface="+mj-ea"/>
                 <a:ea typeface="+mj-ea"/>
               </a:rPr>
-              <a:t>unit </a:t>
+              <a:t>Final estimator</a:t>
             </a:r>
             <a:r>
               <a:rPr lang="ko-KR" altLang="en-US" sz="1400" dirty="0">
                 <a:latin typeface="+mj-ea"/>
                 <a:ea typeface="+mj-ea"/>
               </a:rPr>
-              <a:t>수</a:t>
+              <a:t>는 </a:t>
+            </a:r>
+            <a:r>
+              <a:rPr lang="en-US" altLang="ko-KR" sz="1400" dirty="0" err="1">
+                <a:latin typeface="+mj-ea"/>
+                <a:ea typeface="+mj-ea"/>
+              </a:rPr>
+              <a:t>XGBoost</a:t>
+            </a:r>
+            <a:r>
+              <a:rPr lang="ko-KR" altLang="en-US" sz="1400" dirty="0">
+                <a:latin typeface="+mj-ea"/>
+                <a:ea typeface="+mj-ea"/>
+              </a:rPr>
+              <a:t>를 사용</a:t>
             </a:r>
             <a:endParaRPr lang="en-US" altLang="ko-KR" sz="1400" dirty="0">
               <a:latin typeface="+mj-ea"/>
@@ -12401,88 +13340,9 @@
             </a:endParaRPr>
           </a:p>
           <a:p>
-            <a:pPr marL="1200150" lvl="2" indent="-285750">
-              <a:buFont typeface="Arial" panose="020B0604020202020204" pitchFamily="34" charset="0"/>
-              <a:buChar char="•"/>
-            </a:pPr>
-            <a:r>
-              <a:rPr lang="en-US" altLang="ko-KR" sz="1400" dirty="0">
-                <a:latin typeface="+mj-ea"/>
-                <a:ea typeface="+mj-ea"/>
-              </a:rPr>
-              <a:t>Dense </a:t>
-            </a:r>
-            <a:r>
-              <a:rPr lang="ko-KR" altLang="en-US" sz="1400" dirty="0">
-                <a:latin typeface="+mj-ea"/>
-                <a:ea typeface="+mj-ea"/>
-              </a:rPr>
-              <a:t>은닉층의 활성화 함수</a:t>
-            </a:r>
-            <a:endParaRPr lang="en-US" altLang="ko-KR" sz="1400" dirty="0">
-              <a:latin typeface="+mj-ea"/>
-              <a:ea typeface="+mj-ea"/>
-            </a:endParaRPr>
-          </a:p>
-          <a:p>
-            <a:pPr marL="1200150" lvl="2" indent="-285750">
-              <a:buFont typeface="Arial" panose="020B0604020202020204" pitchFamily="34" charset="0"/>
-              <a:buChar char="•"/>
-            </a:pPr>
-            <a:r>
-              <a:rPr lang="en-US" altLang="ko-KR" sz="1400" dirty="0">
-                <a:latin typeface="+mj-ea"/>
-                <a:ea typeface="+mj-ea"/>
-              </a:rPr>
-              <a:t>Dropout</a:t>
-            </a:r>
-            <a:r>
-              <a:rPr lang="ko-KR" altLang="en-US" sz="1400" dirty="0">
-                <a:latin typeface="+mj-ea"/>
-                <a:ea typeface="+mj-ea"/>
-              </a:rPr>
-              <a:t>의 뉴런 비활성화 비율</a:t>
-            </a:r>
-            <a:endParaRPr lang="en-US" altLang="ko-KR" sz="1400" dirty="0">
-              <a:latin typeface="+mj-ea"/>
-              <a:ea typeface="+mj-ea"/>
-            </a:endParaRPr>
-          </a:p>
-          <a:p>
-            <a:pPr marL="1200150" lvl="2" indent="-285750">
-              <a:buFont typeface="Arial" panose="020B0604020202020204" pitchFamily="34" charset="0"/>
-              <a:buChar char="•"/>
-            </a:pPr>
-            <a:r>
-              <a:rPr lang="ko-KR" altLang="en-US" sz="1400" dirty="0" err="1">
-                <a:latin typeface="+mj-ea"/>
-                <a:ea typeface="+mj-ea"/>
-              </a:rPr>
-              <a:t>옵티마이저의</a:t>
-            </a:r>
-            <a:r>
-              <a:rPr lang="ko-KR" altLang="en-US" sz="1400" dirty="0">
-                <a:latin typeface="+mj-ea"/>
-                <a:ea typeface="+mj-ea"/>
-              </a:rPr>
-              <a:t> 종류와 </a:t>
-            </a:r>
-            <a:r>
-              <a:rPr lang="ko-KR" altLang="en-US" sz="1400" dirty="0" err="1">
-                <a:latin typeface="+mj-ea"/>
-                <a:ea typeface="+mj-ea"/>
-              </a:rPr>
-              <a:t>학습률</a:t>
-            </a:r>
-            <a:endParaRPr lang="en-US" altLang="ko-KR" sz="1400" dirty="0">
-              <a:latin typeface="+mj-ea"/>
-              <a:ea typeface="+mj-ea"/>
-            </a:endParaRPr>
-          </a:p>
-          <a:p>
-            <a:pPr marL="1200150" lvl="2" indent="-285750">
-              <a:buFont typeface="Arial" panose="020B0604020202020204" pitchFamily="34" charset="0"/>
-              <a:buChar char="•"/>
+            <a:pPr marL="228600" indent="-228600">
+              <a:buFont typeface="+mj-lt"/>
+              <a:buAutoNum type="arabicPeriod"/>
             </a:pPr>
             <a:endParaRPr lang="en-US" altLang="ko-KR" sz="1400" dirty="0">
               <a:latin typeface="+mj-ea"/>
@@ -12499,21 +13359,49 @@
                 <a:latin typeface="+mj-ea"/>
                 <a:ea typeface="+mj-ea"/>
               </a:rPr>
-              <a:t>딥러닝 모델 학습 결과 </a:t>
+              <a:t>앙상블 결과 </a:t>
             </a:r>
             <a:r>
               <a:rPr lang="en-US" altLang="ko-KR" sz="1400" dirty="0">
                 <a:latin typeface="+mj-ea"/>
                 <a:ea typeface="+mj-ea"/>
               </a:rPr>
-              <a:t>ACC 0.495</a:t>
+              <a:t>(Soft) Voting</a:t>
             </a:r>
             <a:r>
               <a:rPr lang="ko-KR" altLang="en-US" sz="1400" dirty="0">
                 <a:latin typeface="+mj-ea"/>
                 <a:ea typeface="+mj-ea"/>
               </a:rPr>
-              <a:t>로 확인</a:t>
+              <a:t>에서 </a:t>
+            </a:r>
+            <a:r>
+              <a:rPr lang="en-US" altLang="ko-KR" sz="1400" dirty="0">
+                <a:latin typeface="+mj-ea"/>
+                <a:ea typeface="+mj-ea"/>
+              </a:rPr>
+              <a:t>ACC 0.514, Stacking</a:t>
+            </a:r>
+            <a:r>
+              <a:rPr lang="ko-KR" altLang="en-US" sz="1400" dirty="0">
+                <a:latin typeface="+mj-ea"/>
+                <a:ea typeface="+mj-ea"/>
+              </a:rPr>
+              <a:t>에서는 </a:t>
+            </a:r>
+            <a:r>
+              <a:rPr lang="en-US" altLang="ko-KR" sz="1400" dirty="0">
+                <a:latin typeface="+mj-ea"/>
+                <a:ea typeface="+mj-ea"/>
+              </a:rPr>
+              <a:t>ACC 0.487</a:t>
+            </a:r>
+            <a:r>
+              <a:rPr lang="ko-KR" altLang="en-US" sz="1400" dirty="0">
+                <a:latin typeface="+mj-ea"/>
+                <a:ea typeface="+mj-ea"/>
+              </a:rPr>
+              <a:t>의 결과를 확인함</a:t>
             </a:r>
             <a:endParaRPr lang="en-US" altLang="ko-KR" sz="1400" dirty="0">
               <a:latin typeface="+mj-ea"/>
@@ -12522,49 +13410,40 @@
           </a:p>
         </p:txBody>
       </p:sp>
-      <p:sp>
-        <p:nvSpPr>
-          <p:cNvPr id="4" name="TextBox 3">
+      <p:pic>
+        <p:nvPicPr>
+          <p:cNvPr id="6" name="그림 5">
             <a:extLst>
               <a:ext uri="{FF2B5EF4-FFF2-40B4-BE49-F238E27FC236}">
-                <a16:creationId xmlns:a16="http://schemas.microsoft.com/office/drawing/2014/main" id="{22B319DF-CA88-A76F-145E-A9DFB4DF6BA3}"/>
+                <a16:creationId xmlns:a16="http://schemas.microsoft.com/office/drawing/2014/main" id="{2094B69C-9D2E-CBDE-627B-E73657C8CFE6}"/>
               </a:ext>
             </a:extLst>
           </p:cNvPr>
-          <p:cNvSpPr txBox="1"/>
+          <p:cNvPicPr>
+            <a:picLocks noChangeAspect="1"/>
+          </p:cNvPicPr>
           <p:nvPr/>
-        </p:nvSpPr>
+        </p:nvPicPr>
+        <p:blipFill>
+          <a:blip r:embed="rId2"/>
+          <a:stretch>
+            <a:fillRect/>
+          </a:stretch>
+        </p:blipFill>
         <p:spPr>
           <a:xfrm>
-            <a:off x="7345279" y="3499023"/>
-            <a:ext cx="1963999" cy="369332"/>
+            <a:off x="414407" y="3914363"/>
+            <a:ext cx="5450988" cy="1163883"/>
           </a:xfrm>
           <a:prstGeom prst="rect">
             <a:avLst/>
           </a:prstGeom>
-          <a:noFill/>
         </p:spPr>
-        <p:txBody>
-          <a:bodyPr wrap="none" rtlCol="0">
-            <a:spAutoFit/>
-          </a:bodyPr>
-          <a:lstStyle/>
-          <a:p>
-            <a:r>
-              <a:rPr lang="ko-KR" altLang="en-US">
-                <a:solidFill>
-                  <a:srgbClr val="FF0000"/>
-                </a:solidFill>
-              </a:rPr>
-              <a:t>모델 도식화 필요</a:t>
-            </a:r>
-          </a:p>
-        </p:txBody>
-      </p:sp>
+      </p:pic>
     </p:spTree>
     <p:extLst>
       <p:ext uri="{BB962C8B-B14F-4D97-AF65-F5344CB8AC3E}">
-        <p14:creationId xmlns:p14="http://schemas.microsoft.com/office/powerpoint/2010/main" val="4205894375"/>
+        <p14:creationId xmlns:p14="http://schemas.microsoft.com/office/powerpoint/2010/main" val="2609321503"/>
       </p:ext>
     </p:extLst>
   </p:cSld>
@@ -12670,7 +13549,7 @@
         <p:spPr>
           <a:xfrm>
             <a:off x="186080" y="202712"/>
-            <a:ext cx="2847254" cy="646331"/>
+            <a:ext cx="3121367" cy="646331"/>
           </a:xfrm>
           <a:prstGeom prst="rect">
             <a:avLst/>
@@ -12689,7 +13568,23 @@
                   <a:schemeClr val="bg1"/>
                 </a:solidFill>
               </a:rPr>
-              <a:t>연구결과 요약</a:t>
+              <a:t>모델링 </a:t>
+            </a:r>
+            <a:r>
+              <a:rPr lang="en-US" altLang="ko-KR" sz="3600" spc="-300" dirty="0">
+                <a:solidFill>
+                  <a:schemeClr val="bg1"/>
+                </a:solidFill>
+              </a:rPr>
+              <a:t>- </a:t>
+            </a:r>
+            <a:r>
+              <a:rPr lang="ko-KR" altLang="en-US" sz="3600" spc="-300" dirty="0">
+                <a:solidFill>
+                  <a:schemeClr val="bg1"/>
+                </a:solidFill>
+              </a:rPr>
+              <a:t>딥러닝</a:t>
             </a:r>
           </a:p>
         </p:txBody>
@@ -12709,7 +13604,7 @@
         <p:spPr>
           <a:xfrm>
             <a:off x="339536" y="1264666"/>
-            <a:ext cx="1261884" cy="461665"/>
+            <a:ext cx="3768980" cy="461665"/>
           </a:xfrm>
           <a:prstGeom prst="rect">
             <a:avLst/>
@@ -12729,7 +13624,7 @@
                 </a:solidFill>
                 <a:latin typeface="+mn-ea"/>
               </a:rPr>
-              <a:t>연구결과</a:t>
+              <a:t>딥러닝 모델 구현 및 성능 평가</a:t>
             </a:r>
           </a:p>
         </p:txBody>
@@ -12801,7 +13696,7 @@
         <p:spPr>
           <a:xfrm>
             <a:off x="132080" y="1913974"/>
-            <a:ext cx="10539931" cy="738664"/>
+            <a:ext cx="10539931" cy="3539430"/>
           </a:xfrm>
           <a:prstGeom prst="rect">
             <a:avLst/>
@@ -12823,21 +13718,135 @@
                 <a:latin typeface="+mj-ea"/>
                 <a:ea typeface="+mj-ea"/>
               </a:rPr>
-              <a:t>인적사고의 발생율을 정확도 </a:t>
+              <a:t>딥러닝 모델을 구현하기 위한 분석 목표 확인</a:t>
+            </a:r>
+            <a:endParaRPr lang="en-US" altLang="ko-KR" sz="1400" dirty="0">
+              <a:latin typeface="+mj-ea"/>
+              <a:ea typeface="+mj-ea"/>
+            </a:endParaRPr>
+          </a:p>
+          <a:p>
+            <a:pPr marL="742950" lvl="1" indent="-285750">
+              <a:buFont typeface="Arial" panose="020B0604020202020204" pitchFamily="34" charset="0"/>
+              <a:buChar char="•"/>
+            </a:pPr>
+            <a:r>
+              <a:rPr lang="ko-KR" altLang="en-US" sz="1400" dirty="0">
+                <a:latin typeface="+mj-ea"/>
+                <a:ea typeface="+mj-ea"/>
+              </a:rPr>
+              <a:t>여러 </a:t>
             </a:r>
             <a:r>
               <a:rPr lang="en-US" altLang="ko-KR" sz="1400" dirty="0">
                 <a:latin typeface="+mj-ea"/>
                 <a:ea typeface="+mj-ea"/>
               </a:rPr>
-              <a:t>0.5 </a:t>
+              <a:t>1</a:t>
             </a:r>
             <a:r>
               <a:rPr lang="ko-KR" altLang="en-US" sz="1400" dirty="0">
                 <a:latin typeface="+mj-ea"/>
                 <a:ea typeface="+mj-ea"/>
               </a:rPr>
-              <a:t>내외로 예측 가능한 모델 완성</a:t>
+              <a:t>차원 컬럼으로 구성된 다중 분류 문제</a:t>
+            </a:r>
+            <a:endParaRPr lang="en-US" altLang="ko-KR" sz="1400" dirty="0">
+              <a:latin typeface="+mj-ea"/>
+              <a:ea typeface="+mj-ea"/>
+            </a:endParaRPr>
+          </a:p>
+          <a:p>
+            <a:pPr marL="742950" lvl="1" indent="-285750">
+              <a:buFont typeface="Arial" panose="020B0604020202020204" pitchFamily="34" charset="0"/>
+              <a:buChar char="•"/>
+            </a:pPr>
+            <a:r>
+              <a:rPr lang="ko-KR" altLang="en-US" sz="1400" dirty="0">
+                <a:latin typeface="+mj-ea"/>
+                <a:ea typeface="+mj-ea"/>
+              </a:rPr>
+              <a:t>은닉층의 구성은 </a:t>
+            </a:r>
+            <a:r>
+              <a:rPr lang="en-US" altLang="ko-KR" sz="1400" dirty="0">
+                <a:latin typeface="+mj-ea"/>
+                <a:ea typeface="+mj-ea"/>
+              </a:rPr>
+              <a:t>Dense </a:t>
+            </a:r>
+            <a:r>
+              <a:rPr lang="ko-KR" altLang="en-US" sz="1400" dirty="0">
+                <a:latin typeface="+mj-ea"/>
+                <a:ea typeface="+mj-ea"/>
+              </a:rPr>
+              <a:t>층과 </a:t>
+            </a:r>
+            <a:r>
+              <a:rPr lang="en-US" altLang="ko-KR" sz="1400" dirty="0">
+                <a:latin typeface="+mj-ea"/>
+                <a:ea typeface="+mj-ea"/>
+              </a:rPr>
+              <a:t>Dropout </a:t>
+            </a:r>
+            <a:r>
+              <a:rPr lang="ko-KR" altLang="en-US" sz="1400" dirty="0">
+                <a:latin typeface="+mj-ea"/>
+                <a:ea typeface="+mj-ea"/>
+              </a:rPr>
+              <a:t>층을 사용</a:t>
+            </a:r>
+            <a:endParaRPr lang="en-US" altLang="ko-KR" sz="1400" dirty="0">
+              <a:latin typeface="+mj-ea"/>
+              <a:ea typeface="+mj-ea"/>
+            </a:endParaRPr>
+          </a:p>
+          <a:p>
+            <a:pPr marL="742950" lvl="1" indent="-285750">
+              <a:buFont typeface="Arial" panose="020B0604020202020204" pitchFamily="34" charset="0"/>
+              <a:buChar char="•"/>
+            </a:pPr>
+            <a:r>
+              <a:rPr lang="ko-KR" altLang="en-US" sz="1400" dirty="0">
+                <a:latin typeface="+mj-ea"/>
+                <a:ea typeface="+mj-ea"/>
+              </a:rPr>
+              <a:t>출력층은 </a:t>
+            </a:r>
+            <a:r>
+              <a:rPr lang="en-US" altLang="ko-KR" sz="1400" dirty="0" err="1">
+                <a:latin typeface="+mj-ea"/>
+                <a:ea typeface="+mj-ea"/>
+              </a:rPr>
+              <a:t>softmax</a:t>
+            </a:r>
+            <a:r>
+              <a:rPr lang="en-US" altLang="ko-KR" sz="1400" dirty="0">
+                <a:latin typeface="+mj-ea"/>
+                <a:ea typeface="+mj-ea"/>
+              </a:rPr>
+              <a:t> </a:t>
+            </a:r>
+            <a:r>
+              <a:rPr lang="ko-KR" altLang="en-US" sz="1400" dirty="0">
+                <a:latin typeface="+mj-ea"/>
+                <a:ea typeface="+mj-ea"/>
+              </a:rPr>
+              <a:t>활성화 함수를 적용한 단일 </a:t>
+            </a:r>
+            <a:r>
+              <a:rPr lang="en-US" altLang="ko-KR" sz="1400" dirty="0">
+                <a:latin typeface="+mj-ea"/>
+                <a:ea typeface="+mj-ea"/>
+              </a:rPr>
+              <a:t>Dense </a:t>
+            </a:r>
+            <a:r>
+              <a:rPr lang="ko-KR" altLang="en-US" sz="1400" dirty="0">
+                <a:latin typeface="+mj-ea"/>
+                <a:ea typeface="+mj-ea"/>
+              </a:rPr>
+              <a:t>층으로 구성</a:t>
             </a:r>
             <a:endParaRPr lang="en-US" altLang="ko-KR" sz="1400" dirty="0">
               <a:latin typeface="+mj-ea"/>
@@ -12864,58 +13873,345 @@
                 <a:latin typeface="+mj-ea"/>
                 <a:ea typeface="+mj-ea"/>
               </a:rPr>
-              <a:t>공사환경에 따라 어떠한 작업에서 어떠한 사고가 고위험도에 속하는지 확인할 수 있음</a:t>
+              <a:t>딥러닝 모델 훈련을 위한 모델 구성 및 </a:t>
+            </a:r>
+            <a:r>
+              <a:rPr lang="ko-KR" altLang="en-US" sz="1400" dirty="0" err="1">
+                <a:latin typeface="+mj-ea"/>
+                <a:ea typeface="+mj-ea"/>
+              </a:rPr>
+              <a:t>하이퍼파라미터</a:t>
+            </a:r>
+            <a:r>
+              <a:rPr lang="ko-KR" altLang="en-US" sz="1400" dirty="0">
+                <a:latin typeface="+mj-ea"/>
+                <a:ea typeface="+mj-ea"/>
+              </a:rPr>
+              <a:t> 선정</a:t>
             </a:r>
             <a:endParaRPr lang="en-US" altLang="ko-KR" sz="1400" dirty="0">
               <a:latin typeface="+mj-ea"/>
               <a:ea typeface="+mj-ea"/>
             </a:endParaRPr>
           </a:p>
+          <a:p>
+            <a:pPr marL="685800" lvl="1" indent="-228600">
+              <a:buFont typeface="+mj-lt"/>
+              <a:buAutoNum type="arabicPeriod"/>
+            </a:pPr>
+            <a:r>
+              <a:rPr lang="ko-KR" altLang="en-US" sz="1400" dirty="0">
+                <a:latin typeface="+mj-ea"/>
+                <a:ea typeface="+mj-ea"/>
+              </a:rPr>
+              <a:t>모델 구성은 </a:t>
+            </a:r>
+            <a:r>
+              <a:rPr lang="en-US" altLang="ko-KR" sz="1400" dirty="0">
+                <a:latin typeface="+mj-ea"/>
+                <a:ea typeface="+mj-ea"/>
+              </a:rPr>
+              <a:t>Dense </a:t>
+            </a:r>
+            <a:r>
+              <a:rPr lang="ko-KR" altLang="en-US" sz="1400" dirty="0">
+                <a:latin typeface="+mj-ea"/>
+                <a:ea typeface="+mj-ea"/>
+              </a:rPr>
+              <a:t>층과 </a:t>
+            </a:r>
+            <a:r>
+              <a:rPr lang="en-US" altLang="ko-KR" sz="1400" dirty="0">
+                <a:latin typeface="+mj-ea"/>
+                <a:ea typeface="+mj-ea"/>
+              </a:rPr>
+              <a:t>Dropout </a:t>
+            </a:r>
+            <a:r>
+              <a:rPr lang="ko-KR" altLang="en-US" sz="1400" dirty="0">
+                <a:latin typeface="+mj-ea"/>
+                <a:ea typeface="+mj-ea"/>
+              </a:rPr>
+              <a:t>층을 몇 단으로 쌓을 것인지 다수의 훈련 결과를 바탕으로 결정</a:t>
+            </a:r>
+            <a:endParaRPr lang="en-US" altLang="ko-KR" sz="1400" dirty="0">
+              <a:latin typeface="+mj-ea"/>
+              <a:ea typeface="+mj-ea"/>
+            </a:endParaRPr>
+          </a:p>
+          <a:p>
+            <a:pPr marL="1200150" lvl="2" indent="-285750">
+              <a:buFont typeface="Arial" panose="020B0604020202020204" pitchFamily="34" charset="0"/>
+              <a:buChar char="•"/>
+            </a:pPr>
+            <a:r>
+              <a:rPr lang="ko-KR" altLang="en-US" sz="1400" dirty="0">
+                <a:latin typeface="+mj-ea"/>
+                <a:ea typeface="+mj-ea"/>
+              </a:rPr>
+              <a:t>최종적으로 </a:t>
+            </a:r>
+            <a:r>
+              <a:rPr lang="en-US" altLang="ko-KR" sz="1400" dirty="0">
+                <a:latin typeface="+mj-ea"/>
+                <a:ea typeface="+mj-ea"/>
+              </a:rPr>
+              <a:t>Dense – Dropout – Dense – Dropout – Dense(</a:t>
+            </a:r>
+            <a:r>
+              <a:rPr lang="ko-KR" altLang="en-US" sz="1400" dirty="0" err="1">
+                <a:latin typeface="+mj-ea"/>
+                <a:ea typeface="+mj-ea"/>
+              </a:rPr>
+              <a:t>출력층</a:t>
+            </a:r>
+            <a:r>
+              <a:rPr lang="en-US" altLang="ko-KR" sz="1400" dirty="0">
+                <a:latin typeface="+mj-ea"/>
+                <a:ea typeface="+mj-ea"/>
+              </a:rPr>
+              <a:t>)</a:t>
+            </a:r>
+            <a:r>
+              <a:rPr lang="ko-KR" altLang="en-US" sz="1400" dirty="0">
+                <a:latin typeface="+mj-ea"/>
+                <a:ea typeface="+mj-ea"/>
+              </a:rPr>
+              <a:t>의 구성</a:t>
+            </a:r>
+            <a:endParaRPr lang="en-US" altLang="ko-KR" sz="1400" dirty="0">
+              <a:latin typeface="+mj-ea"/>
+              <a:ea typeface="+mj-ea"/>
+            </a:endParaRPr>
+          </a:p>
+          <a:p>
+            <a:pPr marL="685800" lvl="1" indent="-228600">
+              <a:buFont typeface="+mj-lt"/>
+              <a:buAutoNum type="arabicPeriod"/>
+            </a:pPr>
+            <a:endParaRPr lang="en-US" altLang="ko-KR" sz="1400" dirty="0">
+              <a:latin typeface="+mj-ea"/>
+              <a:ea typeface="+mj-ea"/>
+            </a:endParaRPr>
+          </a:p>
+          <a:p>
+            <a:pPr marL="685800" lvl="1" indent="-228600">
+              <a:buFont typeface="+mj-lt"/>
+              <a:buAutoNum type="arabicPeriod"/>
+            </a:pPr>
+            <a:r>
+              <a:rPr lang="ko-KR" altLang="en-US" sz="1400" dirty="0" err="1">
+                <a:latin typeface="+mj-ea"/>
+                <a:ea typeface="+mj-ea"/>
+              </a:rPr>
+              <a:t>하이퍼파라미터</a:t>
+            </a:r>
+            <a:r>
+              <a:rPr lang="ko-KR" altLang="en-US" sz="1400" dirty="0">
+                <a:latin typeface="+mj-ea"/>
+                <a:ea typeface="+mj-ea"/>
+              </a:rPr>
+              <a:t> 선정</a:t>
+            </a:r>
+            <a:endParaRPr lang="en-US" altLang="ko-KR" sz="1400" dirty="0">
+              <a:latin typeface="+mj-ea"/>
+              <a:ea typeface="+mj-ea"/>
+            </a:endParaRPr>
+          </a:p>
+          <a:p>
+            <a:pPr marL="1200150" lvl="2" indent="-285750">
+              <a:buFont typeface="Arial" panose="020B0604020202020204" pitchFamily="34" charset="0"/>
+              <a:buChar char="•"/>
+            </a:pPr>
+            <a:r>
+              <a:rPr lang="en-US" altLang="ko-KR" sz="1400" dirty="0">
+                <a:latin typeface="+mj-ea"/>
+                <a:ea typeface="+mj-ea"/>
+              </a:rPr>
+              <a:t>Dense </a:t>
+            </a:r>
+            <a:r>
+              <a:rPr lang="ko-KR" altLang="en-US" sz="1400" dirty="0">
+                <a:latin typeface="+mj-ea"/>
+                <a:ea typeface="+mj-ea"/>
+              </a:rPr>
+              <a:t>은닉층의 출력 </a:t>
+            </a:r>
+            <a:r>
+              <a:rPr lang="en-US" altLang="ko-KR" sz="1400" dirty="0">
+                <a:latin typeface="+mj-ea"/>
+                <a:ea typeface="+mj-ea"/>
+              </a:rPr>
+              <a:t>unit </a:t>
+            </a:r>
+            <a:r>
+              <a:rPr lang="ko-KR" altLang="en-US" sz="1400" dirty="0">
+                <a:latin typeface="+mj-ea"/>
+                <a:ea typeface="+mj-ea"/>
+              </a:rPr>
+              <a:t>수</a:t>
+            </a:r>
+            <a:endParaRPr lang="en-US" altLang="ko-KR" sz="1400" dirty="0">
+              <a:latin typeface="+mj-ea"/>
+              <a:ea typeface="+mj-ea"/>
+            </a:endParaRPr>
+          </a:p>
+          <a:p>
+            <a:pPr marL="1200150" lvl="2" indent="-285750">
+              <a:buFont typeface="Arial" panose="020B0604020202020204" pitchFamily="34" charset="0"/>
+              <a:buChar char="•"/>
+            </a:pPr>
+            <a:r>
+              <a:rPr lang="en-US" altLang="ko-KR" sz="1400" dirty="0">
+                <a:latin typeface="+mj-ea"/>
+                <a:ea typeface="+mj-ea"/>
+              </a:rPr>
+              <a:t>Dense </a:t>
+            </a:r>
+            <a:r>
+              <a:rPr lang="ko-KR" altLang="en-US" sz="1400" dirty="0">
+                <a:latin typeface="+mj-ea"/>
+                <a:ea typeface="+mj-ea"/>
+              </a:rPr>
+              <a:t>은닉층의 활성화 함수</a:t>
+            </a:r>
+            <a:endParaRPr lang="en-US" altLang="ko-KR" sz="1400" dirty="0">
+              <a:latin typeface="+mj-ea"/>
+              <a:ea typeface="+mj-ea"/>
+            </a:endParaRPr>
+          </a:p>
+          <a:p>
+            <a:pPr marL="1200150" lvl="2" indent="-285750">
+              <a:buFont typeface="Arial" panose="020B0604020202020204" pitchFamily="34" charset="0"/>
+              <a:buChar char="•"/>
+            </a:pPr>
+            <a:r>
+              <a:rPr lang="en-US" altLang="ko-KR" sz="1400" dirty="0">
+                <a:latin typeface="+mj-ea"/>
+                <a:ea typeface="+mj-ea"/>
+              </a:rPr>
+              <a:t>Dropout</a:t>
+            </a:r>
+            <a:r>
+              <a:rPr lang="ko-KR" altLang="en-US" sz="1400" dirty="0">
+                <a:latin typeface="+mj-ea"/>
+                <a:ea typeface="+mj-ea"/>
+              </a:rPr>
+              <a:t>의 뉴런 비활성화 비율</a:t>
+            </a:r>
+            <a:endParaRPr lang="en-US" altLang="ko-KR" sz="1400" dirty="0">
+              <a:latin typeface="+mj-ea"/>
+              <a:ea typeface="+mj-ea"/>
+            </a:endParaRPr>
+          </a:p>
+          <a:p>
+            <a:pPr marL="1200150" lvl="2" indent="-285750">
+              <a:buFont typeface="Arial" panose="020B0604020202020204" pitchFamily="34" charset="0"/>
+              <a:buChar char="•"/>
+            </a:pPr>
+            <a:r>
+              <a:rPr lang="ko-KR" altLang="en-US" sz="1400" dirty="0" err="1">
+                <a:latin typeface="+mj-ea"/>
+                <a:ea typeface="+mj-ea"/>
+              </a:rPr>
+              <a:t>옵티마이저의</a:t>
+            </a:r>
+            <a:r>
+              <a:rPr lang="ko-KR" altLang="en-US" sz="1400" dirty="0">
+                <a:latin typeface="+mj-ea"/>
+                <a:ea typeface="+mj-ea"/>
+              </a:rPr>
+              <a:t> 종류와 </a:t>
+            </a:r>
+            <a:r>
+              <a:rPr lang="ko-KR" altLang="en-US" sz="1400" dirty="0" err="1">
+                <a:latin typeface="+mj-ea"/>
+                <a:ea typeface="+mj-ea"/>
+              </a:rPr>
+              <a:t>학습률</a:t>
+            </a:r>
+            <a:endParaRPr lang="en-US" altLang="ko-KR" sz="1400" dirty="0">
+              <a:latin typeface="+mj-ea"/>
+              <a:ea typeface="+mj-ea"/>
+            </a:endParaRPr>
+          </a:p>
+          <a:p>
+            <a:pPr marL="1200150" lvl="2" indent="-285750">
+              <a:buFont typeface="Arial" panose="020B0604020202020204" pitchFamily="34" charset="0"/>
+              <a:buChar char="•"/>
+            </a:pPr>
+            <a:endParaRPr lang="en-US" altLang="ko-KR" sz="1400" dirty="0">
+              <a:latin typeface="+mj-ea"/>
+              <a:ea typeface="+mj-ea"/>
+            </a:endParaRPr>
+          </a:p>
+          <a:p>
+            <a:pPr marL="228600" indent="-228600">
+              <a:buFont typeface="+mj-lt"/>
+              <a:buAutoNum type="arabicPeriod"/>
+            </a:pPr>
+            <a:r>
+              <a:rPr lang="ko-KR" altLang="en-US" sz="1400" dirty="0">
+                <a:latin typeface="+mj-ea"/>
+                <a:ea typeface="+mj-ea"/>
+              </a:rPr>
+              <a:t>딥러닝 모델 학습 결과 </a:t>
+            </a:r>
+            <a:r>
+              <a:rPr lang="en-US" altLang="ko-KR" sz="1400" dirty="0">
+                <a:latin typeface="+mj-ea"/>
+                <a:ea typeface="+mj-ea"/>
+              </a:rPr>
+              <a:t>ACC 0.495</a:t>
+            </a:r>
+            <a:r>
+              <a:rPr lang="ko-KR" altLang="en-US" sz="1400" dirty="0">
+                <a:latin typeface="+mj-ea"/>
+                <a:ea typeface="+mj-ea"/>
+              </a:rPr>
+              <a:t>로 확인</a:t>
+            </a:r>
+            <a:endParaRPr lang="en-US" altLang="ko-KR" sz="1400" dirty="0">
+              <a:latin typeface="+mj-ea"/>
+              <a:ea typeface="+mj-ea"/>
+            </a:endParaRPr>
+          </a:p>
         </p:txBody>
       </p:sp>
-      <p:sp>
-        <p:nvSpPr>
-          <p:cNvPr id="4" name="TextBox 3">
+      <p:pic>
+        <p:nvPicPr>
+          <p:cNvPr id="6" name="그림 5">
             <a:extLst>
               <a:ext uri="{FF2B5EF4-FFF2-40B4-BE49-F238E27FC236}">
-                <a16:creationId xmlns:a16="http://schemas.microsoft.com/office/drawing/2014/main" id="{22B319DF-CA88-A76F-145E-A9DFB4DF6BA3}"/>
+                <a16:creationId xmlns:a16="http://schemas.microsoft.com/office/drawing/2014/main" id="{30B57748-9F1A-D7B8-7007-6B4072E77C93}"/>
               </a:ext>
             </a:extLst>
           </p:cNvPr>
-          <p:cNvSpPr txBox="1"/>
+          <p:cNvPicPr>
+            <a:picLocks noChangeAspect="1"/>
+          </p:cNvPicPr>
           <p:nvPr/>
-        </p:nvSpPr>
+        </p:nvPicPr>
+        <p:blipFill>
+          <a:blip r:embed="rId2"/>
+          <a:stretch>
+            <a:fillRect/>
+          </a:stretch>
+        </p:blipFill>
         <p:spPr>
           <a:xfrm>
-            <a:off x="7303168" y="2283306"/>
-            <a:ext cx="1733167" cy="369332"/>
+            <a:off x="7929411" y="3758807"/>
+            <a:ext cx="3353609" cy="2581835"/>
           </a:xfrm>
           <a:prstGeom prst="rect">
             <a:avLst/>
           </a:prstGeom>
-          <a:noFill/>
         </p:spPr>
-        <p:txBody>
-          <a:bodyPr wrap="none" rtlCol="0">
-            <a:spAutoFit/>
-          </a:bodyPr>
-          <a:lstStyle/>
-          <a:p>
-            <a:r>
-              <a:rPr lang="ko-KR" altLang="en-US" dirty="0">
-                <a:solidFill>
-                  <a:srgbClr val="FF0000"/>
-                </a:solidFill>
-              </a:rPr>
-              <a:t>전문 자료 추가</a:t>
-            </a:r>
-          </a:p>
-        </p:txBody>
-      </p:sp>
+      </p:pic>
     </p:spTree>
     <p:extLst>
       <p:ext uri="{BB962C8B-B14F-4D97-AF65-F5344CB8AC3E}">
-        <p14:creationId xmlns:p14="http://schemas.microsoft.com/office/powerpoint/2010/main" val="341173440"/>
+        <p14:creationId xmlns:p14="http://schemas.microsoft.com/office/powerpoint/2010/main" val="4205894375"/>
       </p:ext>
     </p:extLst>
   </p:cSld>
@@ -13021,7 +14317,7 @@
         <p:spPr>
           <a:xfrm>
             <a:off x="186080" y="202712"/>
-            <a:ext cx="5456943" cy="646331"/>
+            <a:ext cx="2847254" cy="646331"/>
           </a:xfrm>
           <a:prstGeom prst="rect">
             <a:avLst/>
@@ -13040,7 +14336,7 @@
                   <a:schemeClr val="bg1"/>
                 </a:solidFill>
               </a:rPr>
-              <a:t>정책 제안 및 연구 기대 효과</a:t>
+              <a:t>연구결과 요약</a:t>
             </a:r>
           </a:p>
         </p:txBody>
@@ -13060,7 +14356,7 @@
         <p:spPr>
           <a:xfrm>
             <a:off x="339536" y="1264666"/>
-            <a:ext cx="1871025" cy="461665"/>
+            <a:ext cx="1261884" cy="461665"/>
           </a:xfrm>
           <a:prstGeom prst="rect">
             <a:avLst/>
@@ -13080,7 +14376,7 @@
                 </a:solidFill>
                 <a:latin typeface="+mn-ea"/>
               </a:rPr>
-              <a:t>연구 기대효과</a:t>
+              <a:t>연구결과</a:t>
             </a:r>
           </a:p>
         </p:txBody>
@@ -13152,7 +14448,7 @@
         <p:spPr>
           <a:xfrm>
             <a:off x="132080" y="1913974"/>
-            <a:ext cx="10539931" cy="1384995"/>
+            <a:ext cx="10539931" cy="738664"/>
           </a:xfrm>
           <a:prstGeom prst="rect">
             <a:avLst/>
@@ -13174,7 +14470,21 @@
                 <a:latin typeface="+mj-ea"/>
                 <a:ea typeface="+mj-ea"/>
               </a:rPr>
-              <a:t>건설업 환경에서의 고위험 요소 사전 감지 및 사전 예방 가능</a:t>
+              <a:t>인적사고의 발생율을 정확도 </a:t>
+            </a:r>
+            <a:r>
+              <a:rPr lang="en-US" altLang="ko-KR" sz="1400" dirty="0">
+                <a:latin typeface="+mj-ea"/>
+                <a:ea typeface="+mj-ea"/>
+              </a:rPr>
+              <a:t>0.5 </a:t>
+            </a:r>
+            <a:r>
+              <a:rPr lang="ko-KR" altLang="en-US" sz="1400" dirty="0">
+                <a:latin typeface="+mj-ea"/>
+                <a:ea typeface="+mj-ea"/>
+              </a:rPr>
+              <a:t>내외로 예측 가능한 모델 완성</a:t>
             </a:r>
             <a:endParaRPr lang="en-US" altLang="ko-KR" sz="1400" dirty="0">
               <a:latin typeface="+mj-ea"/>
@@ -13201,103 +14511,7 @@
                 <a:latin typeface="+mj-ea"/>
                 <a:ea typeface="+mj-ea"/>
               </a:rPr>
-              <a:t>정부 </a:t>
-            </a:r>
-            <a:r>
-              <a:rPr lang="en-US" altLang="ko-KR" sz="1400" dirty="0">
-                <a:latin typeface="+mj-ea"/>
-                <a:ea typeface="+mj-ea"/>
-              </a:rPr>
-              <a:t>/ </a:t>
-            </a:r>
-            <a:r>
-              <a:rPr lang="ko-KR" altLang="en-US" sz="1400" dirty="0">
-                <a:latin typeface="+mj-ea"/>
-                <a:ea typeface="+mj-ea"/>
-              </a:rPr>
-              <a:t>기업 </a:t>
-            </a:r>
-            <a:r>
-              <a:rPr lang="en-US" altLang="ko-KR" sz="1400" dirty="0">
-                <a:latin typeface="+mj-ea"/>
-                <a:ea typeface="+mj-ea"/>
-              </a:rPr>
-              <a:t>/ </a:t>
-            </a:r>
-            <a:r>
-              <a:rPr lang="ko-KR" altLang="en-US" sz="1400" dirty="0">
-                <a:latin typeface="+mj-ea"/>
-                <a:ea typeface="+mj-ea"/>
-              </a:rPr>
-              <a:t>구직자에 대한 기대 효과 제안</a:t>
-            </a:r>
-            <a:r>
-              <a:rPr lang="en-US" altLang="ko-KR" sz="1400" dirty="0">
-                <a:latin typeface="+mj-ea"/>
-                <a:ea typeface="+mj-ea"/>
-              </a:rPr>
-              <a:t>…</a:t>
-            </a:r>
-          </a:p>
-          <a:p>
-            <a:pPr marL="742950" lvl="1" indent="-285750">
-              <a:buFont typeface="Arial" panose="020B0604020202020204" pitchFamily="34" charset="0"/>
-              <a:buChar char="•"/>
-            </a:pPr>
-            <a:r>
-              <a:rPr lang="ko-KR" altLang="en-US" sz="1400" dirty="0">
-                <a:latin typeface="+mj-ea"/>
-                <a:ea typeface="+mj-ea"/>
-              </a:rPr>
-              <a:t>정부는 고위험군 발생 예방을 위한 법적 정책 수립</a:t>
-            </a:r>
-            <a:endParaRPr lang="en-US" altLang="ko-KR" sz="1400" dirty="0">
-              <a:latin typeface="+mj-ea"/>
-              <a:ea typeface="+mj-ea"/>
-            </a:endParaRPr>
-          </a:p>
-          <a:p>
-            <a:pPr marL="742950" lvl="1" indent="-285750">
-              <a:buFont typeface="Arial" panose="020B0604020202020204" pitchFamily="34" charset="0"/>
-              <a:buChar char="•"/>
-            </a:pPr>
-            <a:r>
-              <a:rPr lang="ko-KR" altLang="en-US" sz="1400" dirty="0">
-                <a:latin typeface="+mj-ea"/>
-                <a:ea typeface="+mj-ea"/>
-              </a:rPr>
-              <a:t>기업은 산재 사전 발생을 대비하여 이윤 손실 최소화</a:t>
-            </a:r>
-            <a:endParaRPr lang="en-US" altLang="ko-KR" sz="1400" dirty="0">
-              <a:latin typeface="+mj-ea"/>
-              <a:ea typeface="+mj-ea"/>
-            </a:endParaRPr>
-          </a:p>
-          <a:p>
-            <a:pPr marL="742950" lvl="1" indent="-285750">
-              <a:buFont typeface="Arial" panose="020B0604020202020204" pitchFamily="34" charset="0"/>
-              <a:buChar char="•"/>
-            </a:pPr>
-            <a:r>
-              <a:rPr lang="ko-KR" altLang="en-US" sz="1400" dirty="0">
-                <a:latin typeface="+mj-ea"/>
-                <a:ea typeface="+mj-ea"/>
-              </a:rPr>
-              <a:t>구직 </a:t>
-            </a:r>
-            <a:r>
-              <a:rPr lang="en-US" altLang="ko-KR" sz="1400" dirty="0">
-                <a:latin typeface="+mj-ea"/>
-                <a:ea typeface="+mj-ea"/>
-              </a:rPr>
-              <a:t>/ </a:t>
-            </a:r>
-            <a:r>
-              <a:rPr lang="ko-KR" altLang="en-US" sz="1400" dirty="0">
-                <a:latin typeface="+mj-ea"/>
-                <a:ea typeface="+mj-ea"/>
-              </a:rPr>
-              <a:t>종사자는 직업 선택 및 산재 발생에 의한 책임 부가에 대한 전문적인 뒷받침이 되는 자료 제공</a:t>
+              <a:t>공사환경에 따라 어떠한 작업에서 어떠한 사고가 고위험도에 속하는지 확인할 수 있음</a:t>
             </a:r>
             <a:endParaRPr lang="en-US" altLang="ko-KR" sz="1400" dirty="0">
               <a:latin typeface="+mj-ea"/>
@@ -13320,8 +14534,8 @@
         </p:nvSpPr>
         <p:spPr>
           <a:xfrm>
-            <a:off x="7345279" y="3499023"/>
-            <a:ext cx="1963999" cy="369332"/>
+            <a:off x="7303168" y="2283306"/>
+            <a:ext cx="1733167" cy="369332"/>
           </a:xfrm>
           <a:prstGeom prst="rect">
             <a:avLst/>
@@ -13340,7 +14554,7 @@
                   <a:srgbClr val="FF0000"/>
                 </a:solidFill>
               </a:rPr>
-              <a:t>모델 도식화 필요</a:t>
+              <a:t>전문 자료 추가</a:t>
             </a:r>
           </a:p>
         </p:txBody>
@@ -13348,7 +14562,7 @@
     </p:spTree>
     <p:extLst>
       <p:ext uri="{BB962C8B-B14F-4D97-AF65-F5344CB8AC3E}">
-        <p14:creationId xmlns:p14="http://schemas.microsoft.com/office/powerpoint/2010/main" val="3258784534"/>
+        <p14:creationId xmlns:p14="http://schemas.microsoft.com/office/powerpoint/2010/main" val="341173440"/>
       </p:ext>
     </p:extLst>
   </p:cSld>
@@ -13454,7 +14668,7 @@
         <p:spPr>
           <a:xfrm>
             <a:off x="186080" y="202712"/>
-            <a:ext cx="6179897" cy="646331"/>
+            <a:ext cx="5456943" cy="646331"/>
           </a:xfrm>
           <a:prstGeom prst="rect">
             <a:avLst/>
@@ -13473,7 +14687,7 @@
                   <a:schemeClr val="bg1"/>
                 </a:solidFill>
               </a:rPr>
-              <a:t>연구의 한계점 및 향후 연구제안</a:t>
+              <a:t>정책 제안 및 연구 기대 효과</a:t>
             </a:r>
           </a:p>
         </p:txBody>
@@ -13513,7 +14727,7 @@
                 </a:solidFill>
                 <a:latin typeface="+mn-ea"/>
               </a:rPr>
-              <a:t>연구의 한계점</a:t>
+              <a:t>연구 기대효과</a:t>
             </a:r>
           </a:p>
         </p:txBody>
@@ -13585,7 +14799,7 @@
         <p:spPr>
           <a:xfrm>
             <a:off x="132080" y="1913974"/>
-            <a:ext cx="10539931" cy="738664"/>
+            <a:ext cx="10539931" cy="1384995"/>
           </a:xfrm>
           <a:prstGeom prst="rect">
             <a:avLst/>
@@ -13607,21 +14821,7 @@
                 <a:latin typeface="+mj-ea"/>
                 <a:ea typeface="+mj-ea"/>
               </a:rPr>
-              <a:t>산재 </a:t>
-            </a:r>
-            <a:r>
-              <a:rPr lang="ko-KR" altLang="en-US" sz="1400" dirty="0" err="1">
-                <a:latin typeface="+mj-ea"/>
-                <a:ea typeface="+mj-ea"/>
-              </a:rPr>
-              <a:t>발생율</a:t>
-            </a:r>
-            <a:r>
-              <a:rPr lang="ko-KR" altLang="en-US" sz="1400" dirty="0">
-                <a:latin typeface="+mj-ea"/>
-                <a:ea typeface="+mj-ea"/>
-              </a:rPr>
-              <a:t> 자체는 확인하기 어려움</a:t>
+              <a:t>건설업 환경에서의 고위험 요소 사전 감지 및 사전 예방 가능</a:t>
             </a:r>
             <a:endParaRPr lang="en-US" altLang="ko-KR" sz="1400" dirty="0">
               <a:latin typeface="+mj-ea"/>
@@ -13644,69 +14844,119 @@
               <a:buAutoNum type="arabicPeriod"/>
             </a:pPr>
             <a:r>
+              <a:rPr lang="ko-KR" altLang="en-US" sz="1400" dirty="0">
+                <a:latin typeface="+mj-ea"/>
+                <a:ea typeface="+mj-ea"/>
+              </a:rPr>
+              <a:t>정부 </a:t>
+            </a:r>
+            <a:r>
               <a:rPr lang="en-US" altLang="ko-KR" sz="1400" dirty="0">
                 <a:latin typeface="+mj-ea"/>
                 <a:ea typeface="+mj-ea"/>
               </a:rPr>
-              <a:t>0.5</a:t>
+              <a:t>/ </a:t>
             </a:r>
             <a:r>
               <a:rPr lang="ko-KR" altLang="en-US" sz="1400" dirty="0">
                 <a:latin typeface="+mj-ea"/>
                 <a:ea typeface="+mj-ea"/>
               </a:rPr>
-              <a:t>의 정확도에서 추가 개선 필요</a:t>
+              <a:t>기업 </a:t>
+            </a:r>
+            <a:r>
+              <a:rPr lang="en-US" altLang="ko-KR" sz="1400" dirty="0">
+                <a:latin typeface="+mj-ea"/>
+                <a:ea typeface="+mj-ea"/>
+              </a:rPr>
+              <a:t>/ </a:t>
+            </a:r>
+            <a:r>
+              <a:rPr lang="ko-KR" altLang="en-US" sz="1400" dirty="0">
+                <a:latin typeface="+mj-ea"/>
+                <a:ea typeface="+mj-ea"/>
+              </a:rPr>
+              <a:t>구직자에 대한 기대 효과 제안</a:t>
+            </a:r>
+            <a:r>
+              <a:rPr lang="en-US" altLang="ko-KR" sz="1400" dirty="0">
+                <a:latin typeface="+mj-ea"/>
+                <a:ea typeface="+mj-ea"/>
+              </a:rPr>
+              <a:t>…</a:t>
+            </a:r>
+          </a:p>
+          <a:p>
+            <a:pPr marL="742950" lvl="1" indent="-285750">
+              <a:buFont typeface="Arial" panose="020B0604020202020204" pitchFamily="34" charset="0"/>
+              <a:buChar char="•"/>
+            </a:pPr>
+            <a:r>
+              <a:rPr lang="ko-KR" altLang="en-US" sz="1400" dirty="0">
+                <a:latin typeface="+mj-ea"/>
+                <a:ea typeface="+mj-ea"/>
+              </a:rPr>
+              <a:t>정부는 고위험군 발생 예방을 위한 법적 정책 수립</a:t>
             </a:r>
             <a:endParaRPr lang="en-US" altLang="ko-KR" sz="1400" dirty="0">
               <a:latin typeface="+mj-ea"/>
               <a:ea typeface="+mj-ea"/>
             </a:endParaRPr>
           </a:p>
-        </p:txBody>
-      </p:sp>
-      <p:sp>
-        <p:nvSpPr>
-          <p:cNvPr id="4" name="TextBox 3">
-            <a:extLst>
-              <a:ext uri="{FF2B5EF4-FFF2-40B4-BE49-F238E27FC236}">
-                <a16:creationId xmlns:a16="http://schemas.microsoft.com/office/drawing/2014/main" id="{22B319DF-CA88-A76F-145E-A9DFB4DF6BA3}"/>
-              </a:ext>
-            </a:extLst>
-          </p:cNvPr>
-          <p:cNvSpPr txBox="1"/>
-          <p:nvPr/>
-        </p:nvSpPr>
-        <p:spPr>
-          <a:xfrm>
-            <a:off x="3633537" y="2085313"/>
-            <a:ext cx="7301999" cy="369332"/>
-          </a:xfrm>
-          <a:prstGeom prst="rect">
-            <a:avLst/>
-          </a:prstGeom>
-          <a:noFill/>
-        </p:spPr>
-        <p:txBody>
-          <a:bodyPr wrap="none" rtlCol="0">
-            <a:spAutoFit/>
-          </a:bodyPr>
-          <a:lstStyle/>
-          <a:p>
-            <a:r>
-              <a:rPr lang="ko-KR" altLang="en-US" dirty="0">
-                <a:solidFill>
-                  <a:srgbClr val="FF0000"/>
-                </a:solidFill>
-              </a:rPr>
-              <a:t>보다 상세하거나 필요한 기준에 알맞은 데이터가 추가되면 해소 가능</a:t>
-            </a:r>
+          <a:p>
+            <a:pPr marL="742950" lvl="1" indent="-285750">
+              <a:buFont typeface="Arial" panose="020B0604020202020204" pitchFamily="34" charset="0"/>
+              <a:buChar char="•"/>
+            </a:pPr>
+            <a:r>
+              <a:rPr lang="ko-KR" altLang="en-US" sz="1400" dirty="0">
+                <a:latin typeface="+mj-ea"/>
+                <a:ea typeface="+mj-ea"/>
+              </a:rPr>
+              <a:t>기업은 산재 사전 발생을 대비하여 이윤 손실 최소화</a:t>
+            </a:r>
+            <a:endParaRPr lang="en-US" altLang="ko-KR" sz="1400" dirty="0">
+              <a:latin typeface="+mj-ea"/>
+              <a:ea typeface="+mj-ea"/>
+            </a:endParaRPr>
+          </a:p>
+          <a:p>
+            <a:pPr marL="742950" lvl="1" indent="-285750">
+              <a:buFont typeface="Arial" panose="020B0604020202020204" pitchFamily="34" charset="0"/>
+              <a:buChar char="•"/>
+            </a:pPr>
+            <a:r>
+              <a:rPr lang="ko-KR" altLang="en-US" sz="1400" dirty="0">
+                <a:latin typeface="+mj-ea"/>
+                <a:ea typeface="+mj-ea"/>
+              </a:rPr>
+              <a:t>구직 </a:t>
+            </a:r>
+            <a:r>
+              <a:rPr lang="en-US" altLang="ko-KR" sz="1400" dirty="0">
+                <a:latin typeface="+mj-ea"/>
+                <a:ea typeface="+mj-ea"/>
+              </a:rPr>
+              <a:t>/ </a:t>
+            </a:r>
+            <a:r>
+              <a:rPr lang="ko-KR" altLang="en-US" sz="1400" dirty="0">
+                <a:latin typeface="+mj-ea"/>
+                <a:ea typeface="+mj-ea"/>
+              </a:rPr>
+              <a:t>종사자는 직업 선택 및 산재 발생에 의한 책임 부가에 대한 전문적인 뒷받침이 되는 자료 제공</a:t>
+            </a:r>
+            <a:endParaRPr lang="en-US" altLang="ko-KR" sz="1400" dirty="0">
+              <a:latin typeface="+mj-ea"/>
+              <a:ea typeface="+mj-ea"/>
+            </a:endParaRPr>
           </a:p>
         </p:txBody>
       </p:sp>
     </p:spTree>
     <p:extLst>
       <p:ext uri="{BB962C8B-B14F-4D97-AF65-F5344CB8AC3E}">
-        <p14:creationId xmlns:p14="http://schemas.microsoft.com/office/powerpoint/2010/main" val="1567205572"/>
+        <p14:creationId xmlns:p14="http://schemas.microsoft.com/office/powerpoint/2010/main" val="3258784534"/>
       </p:ext>
     </p:extLst>
   </p:cSld>

</xml_diff>